<commit_message>
Colocação dos Access Points nos pisos e identificação do alcance deles
</commit_message>
<xml_diff>
--- a/doc/sprint1/1201386/Cabeamento estruturado.pptx
+++ b/doc/sprint1/1201386/Cabeamento estruturado.pptx
@@ -116,7 +116,7 @@
 <file path=ppt/revisionInfo.xml><?xml version="1.0" encoding="utf-8"?>
 <p1510:revInfo xmlns:a="http://schemas.openxmlformats.org/drawingml/2006/main" xmlns:r="http://schemas.openxmlformats.org/officeDocument/2006/relationships" xmlns:p1510="http://schemas.microsoft.com/office/powerpoint/2015/10/main">
   <p1510:revLst>
-    <p1510:client id="{521A3E97-D9B2-46D2-B8AE-2A70BC795E9E}" v="411" dt="2022-03-18T01:45:41.463"/>
+    <p1510:client id="{521A3E97-D9B2-46D2-B8AE-2A70BC795E9E}" v="418" dt="2022-03-18T15:46:33.036"/>
   </p1510:revLst>
 </p1510:revInfo>
 </file>
@@ -126,12 +126,12 @@
   <pc:docChgLst>
     <pc:chgData name="Rita Sobral (1201386)" userId="a10e2ee0-50b2-4678-bcd9-890343c2a6f4" providerId="ADAL" clId="{521A3E97-D9B2-46D2-B8AE-2A70BC795E9E}"/>
     <pc:docChg chg="undo custSel addSld delSld modSld">
-      <pc:chgData name="Rita Sobral (1201386)" userId="a10e2ee0-50b2-4678-bcd9-890343c2a6f4" providerId="ADAL" clId="{521A3E97-D9B2-46D2-B8AE-2A70BC795E9E}" dt="2022-03-18T01:45:49.437" v="2073" actId="1076"/>
+      <pc:chgData name="Rita Sobral (1201386)" userId="a10e2ee0-50b2-4678-bcd9-890343c2a6f4" providerId="ADAL" clId="{521A3E97-D9B2-46D2-B8AE-2A70BC795E9E}" dt="2022-03-18T15:46:50.558" v="2195" actId="1076"/>
       <pc:docMkLst>
         <pc:docMk/>
       </pc:docMkLst>
       <pc:sldChg chg="addSp delSp modSp mod">
-        <pc:chgData name="Rita Sobral (1201386)" userId="a10e2ee0-50b2-4678-bcd9-890343c2a6f4" providerId="ADAL" clId="{521A3E97-D9B2-46D2-B8AE-2A70BC795E9E}" dt="2022-03-18T01:45:16.608" v="2070" actId="1076"/>
+        <pc:chgData name="Rita Sobral (1201386)" userId="a10e2ee0-50b2-4678-bcd9-890343c2a6f4" providerId="ADAL" clId="{521A3E97-D9B2-46D2-B8AE-2A70BC795E9E}" dt="2022-03-18T15:46:50.558" v="2195" actId="1076"/>
         <pc:sldMkLst>
           <pc:docMk/>
           <pc:sldMk cId="212155394" sldId="256"/>
@@ -176,12 +176,20 @@
             <ac:spMk id="109" creationId="{C13876C7-3E3C-4A45-83FC-A5C1ADB685D1}"/>
           </ac:spMkLst>
         </pc:spChg>
+        <pc:spChg chg="add del mod">
+          <ac:chgData name="Rita Sobral (1201386)" userId="a10e2ee0-50b2-4678-bcd9-890343c2a6f4" providerId="ADAL" clId="{521A3E97-D9B2-46D2-B8AE-2A70BC795E9E}" dt="2022-03-18T15:46:32.468" v="2193" actId="478"/>
+          <ac:spMkLst>
+            <pc:docMk/>
+            <pc:sldMk cId="212155394" sldId="256"/>
+            <ac:spMk id="133" creationId="{2948D6F1-7584-48DF-8368-D61E0B3255F4}"/>
+          </ac:spMkLst>
+        </pc:spChg>
         <pc:spChg chg="add mod">
-          <ac:chgData name="Rita Sobral (1201386)" userId="a10e2ee0-50b2-4678-bcd9-890343c2a6f4" providerId="ADAL" clId="{521A3E97-D9B2-46D2-B8AE-2A70BC795E9E}" dt="2022-03-18T01:44:20.884" v="2064" actId="1076"/>
+          <ac:chgData name="Rita Sobral (1201386)" userId="a10e2ee0-50b2-4678-bcd9-890343c2a6f4" providerId="ADAL" clId="{521A3E97-D9B2-46D2-B8AE-2A70BC795E9E}" dt="2022-03-18T15:46:50.558" v="2195" actId="1076"/>
           <ac:spMkLst>
             <pc:docMk/>
             <pc:sldMk cId="212155394" sldId="256"/>
-            <ac:spMk id="133" creationId="{2948D6F1-7584-48DF-8368-D61E0B3255F4}"/>
+            <ac:spMk id="177" creationId="{67D1FFEA-07EA-4B31-B84C-EBF3CB11864C}"/>
           </ac:spMkLst>
         </pc:spChg>
         <pc:picChg chg="add del mod">
@@ -464,8 +472,8 @@
             <ac:picMk id="37" creationId="{1F42FFC4-F0FF-4C3B-B8DC-98C3AF093C18}"/>
           </ac:picMkLst>
         </pc:picChg>
-        <pc:picChg chg="add mod">
-          <ac:chgData name="Rita Sobral (1201386)" userId="a10e2ee0-50b2-4678-bcd9-890343c2a6f4" providerId="ADAL" clId="{521A3E97-D9B2-46D2-B8AE-2A70BC795E9E}" dt="2022-03-18T01:44:53.962" v="2066" actId="1076"/>
+        <pc:picChg chg="add mod ord">
+          <ac:chgData name="Rita Sobral (1201386)" userId="a10e2ee0-50b2-4678-bcd9-890343c2a6f4" providerId="ADAL" clId="{521A3E97-D9B2-46D2-B8AE-2A70BC795E9E}" dt="2022-03-18T15:38:29.071" v="2189" actId="1076"/>
           <ac:picMkLst>
             <pc:docMk/>
             <pc:sldMk cId="212155394" sldId="256"/>
@@ -1104,8 +1112,8 @@
             <ac:picMk id="120" creationId="{1FFC164D-B6B3-4E41-B73E-7E6BADF69CFE}"/>
           </ac:picMkLst>
         </pc:picChg>
-        <pc:picChg chg="add mod">
-          <ac:chgData name="Rita Sobral (1201386)" userId="a10e2ee0-50b2-4678-bcd9-890343c2a6f4" providerId="ADAL" clId="{521A3E97-D9B2-46D2-B8AE-2A70BC795E9E}" dt="2022-03-18T01:45:16.608" v="2070" actId="1076"/>
+        <pc:picChg chg="add mod ord">
+          <ac:chgData name="Rita Sobral (1201386)" userId="a10e2ee0-50b2-4678-bcd9-890343c2a6f4" providerId="ADAL" clId="{521A3E97-D9B2-46D2-B8AE-2A70BC795E9E}" dt="2022-03-18T15:38:25.749" v="2188" actId="1076"/>
           <ac:picMkLst>
             <pc:docMk/>
             <pc:sldMk cId="212155394" sldId="256"/>
@@ -1481,7 +1489,7 @@
           </ac:cxnSpMkLst>
         </pc:cxnChg>
         <pc:cxnChg chg="add mod ord">
-          <ac:chgData name="Rita Sobral (1201386)" userId="a10e2ee0-50b2-4678-bcd9-890343c2a6f4" providerId="ADAL" clId="{521A3E97-D9B2-46D2-B8AE-2A70BC795E9E}" dt="2022-03-15T23:33:44.245" v="1743" actId="14100"/>
+          <ac:chgData name="Rita Sobral (1201386)" userId="a10e2ee0-50b2-4678-bcd9-890343c2a6f4" providerId="ADAL" clId="{521A3E97-D9B2-46D2-B8AE-2A70BC795E9E}" dt="2022-03-18T14:07:34.397" v="2079" actId="14100"/>
           <ac:cxnSpMkLst>
             <pc:docMk/>
             <pc:sldMk cId="212155394" sldId="256"/>
@@ -1601,6 +1609,14 @@
           </ac:cxnSpMkLst>
         </pc:cxnChg>
         <pc:cxnChg chg="add mod">
+          <ac:chgData name="Rita Sobral (1201386)" userId="a10e2ee0-50b2-4678-bcd9-890343c2a6f4" providerId="ADAL" clId="{521A3E97-D9B2-46D2-B8AE-2A70BC795E9E}" dt="2022-03-18T15:31:52.984" v="2138" actId="14100"/>
+          <ac:cxnSpMkLst>
+            <pc:docMk/>
+            <pc:sldMk cId="212155394" sldId="256"/>
+            <ac:cxnSpMk id="164" creationId="{480B2D32-6DF1-43C9-BB19-529FB0B83A71}"/>
+          </ac:cxnSpMkLst>
+        </pc:cxnChg>
+        <pc:cxnChg chg="add mod">
           <ac:chgData name="Rita Sobral (1201386)" userId="a10e2ee0-50b2-4678-bcd9-890343c2a6f4" providerId="ADAL" clId="{521A3E97-D9B2-46D2-B8AE-2A70BC795E9E}" dt="2022-03-16T22:05:19.010" v="1899" actId="1076"/>
           <ac:cxnSpMkLst>
             <pc:docMk/>
@@ -1680,19 +1696,51 @@
             <ac:cxnSpMk id="174" creationId="{C4EB5F81-6CDE-429C-BA73-A7BE1D0C59E0}"/>
           </ac:cxnSpMkLst>
         </pc:cxnChg>
+        <pc:cxnChg chg="add mod">
+          <ac:chgData name="Rita Sobral (1201386)" userId="a10e2ee0-50b2-4678-bcd9-890343c2a6f4" providerId="ADAL" clId="{521A3E97-D9B2-46D2-B8AE-2A70BC795E9E}" dt="2022-03-18T15:38:06.854" v="2183" actId="14100"/>
+          <ac:cxnSpMkLst>
+            <pc:docMk/>
+            <pc:sldMk cId="212155394" sldId="256"/>
+            <ac:cxnSpMk id="175" creationId="{3788107F-9AFE-4DC0-9D4A-CD48770C055E}"/>
+          </ac:cxnSpMkLst>
+        </pc:cxnChg>
+        <pc:cxnChg chg="add mod">
+          <ac:chgData name="Rita Sobral (1201386)" userId="a10e2ee0-50b2-4678-bcd9-890343c2a6f4" providerId="ADAL" clId="{521A3E97-D9B2-46D2-B8AE-2A70BC795E9E}" dt="2022-03-18T15:38:19.223" v="2186" actId="1076"/>
+          <ac:cxnSpMkLst>
+            <pc:docMk/>
+            <pc:sldMk cId="212155394" sldId="256"/>
+            <ac:cxnSpMk id="176" creationId="{38FD9FC9-5692-433D-8BD6-33B3C958D76E}"/>
+          </ac:cxnSpMkLst>
+        </pc:cxnChg>
       </pc:sldChg>
       <pc:sldChg chg="addSp delSp modSp mod">
-        <pc:chgData name="Rita Sobral (1201386)" userId="a10e2ee0-50b2-4678-bcd9-890343c2a6f4" providerId="ADAL" clId="{521A3E97-D9B2-46D2-B8AE-2A70BC795E9E}" dt="2022-03-18T01:45:49.437" v="2073" actId="1076"/>
+        <pc:chgData name="Rita Sobral (1201386)" userId="a10e2ee0-50b2-4678-bcd9-890343c2a6f4" providerId="ADAL" clId="{521A3E97-D9B2-46D2-B8AE-2A70BC795E9E}" dt="2022-03-18T15:46:21.722" v="2192" actId="14100"/>
         <pc:sldMkLst>
           <pc:docMk/>
           <pc:sldMk cId="1211775621" sldId="257"/>
         </pc:sldMkLst>
+        <pc:spChg chg="add del mod">
+          <ac:chgData name="Rita Sobral (1201386)" userId="a10e2ee0-50b2-4678-bcd9-890343c2a6f4" providerId="ADAL" clId="{521A3E97-D9B2-46D2-B8AE-2A70BC795E9E}" dt="2022-03-18T15:06:24.106" v="2128" actId="478"/>
+          <ac:spMkLst>
+            <pc:docMk/>
+            <pc:sldMk cId="1211775621" sldId="257"/>
+            <ac:spMk id="153" creationId="{0787AAA0-7EB1-4AE8-AC8B-4EAB7FB1C5EC}"/>
+          </ac:spMkLst>
+        </pc:spChg>
         <pc:spChg chg="add mod">
-          <ac:chgData name="Rita Sobral (1201386)" userId="a10e2ee0-50b2-4678-bcd9-890343c2a6f4" providerId="ADAL" clId="{521A3E97-D9B2-46D2-B8AE-2A70BC795E9E}" dt="2022-03-18T01:36:30.801" v="2062" actId="1076"/>
+          <ac:chgData name="Rita Sobral (1201386)" userId="a10e2ee0-50b2-4678-bcd9-890343c2a6f4" providerId="ADAL" clId="{521A3E97-D9B2-46D2-B8AE-2A70BC795E9E}" dt="2022-03-18T15:46:21.722" v="2192" actId="14100"/>
           <ac:spMkLst>
             <pc:docMk/>
             <pc:sldMk cId="1211775621" sldId="257"/>
-            <ac:spMk id="153" creationId="{0787AAA0-7EB1-4AE8-AC8B-4EAB7FB1C5EC}"/>
+            <ac:spMk id="155" creationId="{ED7569A3-E764-4243-AF7B-77119654D2E9}"/>
+          </ac:spMkLst>
+        </pc:spChg>
+        <pc:spChg chg="add del mod">
+          <ac:chgData name="Rita Sobral (1201386)" userId="a10e2ee0-50b2-4678-bcd9-890343c2a6f4" providerId="ADAL" clId="{521A3E97-D9B2-46D2-B8AE-2A70BC795E9E}" dt="2022-03-18T15:21:01.646" v="2136" actId="478"/>
+          <ac:spMkLst>
+            <pc:docMk/>
+            <pc:sldMk cId="1211775621" sldId="257"/>
+            <ac:spMk id="156" creationId="{641F1279-B862-493B-8573-A41C0C451518}"/>
           </ac:spMkLst>
         </pc:spChg>
         <pc:picChg chg="add del mod">
@@ -2535,16 +2583,16 @@
             <ac:picMk id="123" creationId="{7BED3322-CD33-40C3-A565-4F98C8BDE83E}"/>
           </ac:picMkLst>
         </pc:picChg>
-        <pc:picChg chg="add mod">
-          <ac:chgData name="Rita Sobral (1201386)" userId="a10e2ee0-50b2-4678-bcd9-890343c2a6f4" providerId="ADAL" clId="{521A3E97-D9B2-46D2-B8AE-2A70BC795E9E}" dt="2022-03-18T01:36:10.982" v="2058" actId="1076"/>
+        <pc:picChg chg="add mod ord">
+          <ac:chgData name="Rita Sobral (1201386)" userId="a10e2ee0-50b2-4678-bcd9-890343c2a6f4" providerId="ADAL" clId="{521A3E97-D9B2-46D2-B8AE-2A70BC795E9E}" dt="2022-03-18T15:36:02.980" v="2181" actId="1076"/>
           <ac:picMkLst>
             <pc:docMk/>
             <pc:sldMk cId="1211775621" sldId="257"/>
             <ac:picMk id="151" creationId="{39F07EEE-C135-466C-BAA6-6AC0799A0450}"/>
           </ac:picMkLst>
         </pc:picChg>
-        <pc:picChg chg="add mod">
-          <ac:chgData name="Rita Sobral (1201386)" userId="a10e2ee0-50b2-4678-bcd9-890343c2a6f4" providerId="ADAL" clId="{521A3E97-D9B2-46D2-B8AE-2A70BC795E9E}" dt="2022-03-18T01:45:49.437" v="2073" actId="1076"/>
+        <pc:picChg chg="add mod ord">
+          <ac:chgData name="Rita Sobral (1201386)" userId="a10e2ee0-50b2-4678-bcd9-890343c2a6f4" providerId="ADAL" clId="{521A3E97-D9B2-46D2-B8AE-2A70BC795E9E}" dt="2022-03-18T15:35:59.345" v="2180" actId="1076"/>
           <ac:picMkLst>
             <pc:docMk/>
             <pc:sldMk cId="1211775621" sldId="257"/>
@@ -2821,6 +2869,14 @@
             <pc:docMk/>
             <pc:sldMk cId="1211775621" sldId="257"/>
             <ac:cxnSpMk id="162" creationId="{4B3F5E7E-7B59-4915-8276-CD04ED654280}"/>
+          </ac:cxnSpMkLst>
+        </pc:cxnChg>
+        <pc:cxnChg chg="add mod">
+          <ac:chgData name="Rita Sobral (1201386)" userId="a10e2ee0-50b2-4678-bcd9-890343c2a6f4" providerId="ADAL" clId="{521A3E97-D9B2-46D2-B8AE-2A70BC795E9E}" dt="2022-03-18T15:35:48.862" v="2177" actId="14100"/>
+          <ac:cxnSpMkLst>
+            <pc:docMk/>
+            <pc:sldMk cId="1211775621" sldId="257"/>
+            <ac:cxnSpMk id="163" creationId="{8B292DC1-FD7B-4A65-8409-D411ABB9BAE7}"/>
           </ac:cxnSpMkLst>
         </pc:cxnChg>
         <pc:cxnChg chg="add mod">
@@ -9519,8 +9575,8 @@
         </p:nvCxnSpPr>
         <p:spPr>
           <a:xfrm flipH="1">
-            <a:off x="5088257" y="3308500"/>
-            <a:ext cx="1626694" cy="9069"/>
+            <a:off x="5088257" y="3309891"/>
+            <a:ext cx="2626124" cy="7678"/>
           </a:xfrm>
           <a:prstGeom prst="line">
             <a:avLst/>
@@ -10846,6 +10902,155 @@
           </a:prstGeom>
         </p:spPr>
       </p:pic>
+      <p:cxnSp>
+        <p:nvCxnSpPr>
+          <p:cNvPr id="164" name="Conexão reta 163">
+            <a:extLst>
+              <a:ext uri="{FF2B5EF4-FFF2-40B4-BE49-F238E27FC236}">
+                <a16:creationId xmlns:a16="http://schemas.microsoft.com/office/drawing/2014/main" id="{480B2D32-6DF1-43C9-BB19-529FB0B83A71}"/>
+              </a:ext>
+            </a:extLst>
+          </p:cNvPr>
+          <p:cNvCxnSpPr>
+            <a:cxnSpLocks/>
+          </p:cNvCxnSpPr>
+          <p:nvPr/>
+        </p:nvCxnSpPr>
+        <p:spPr>
+          <a:xfrm flipH="1" flipV="1">
+            <a:off x="7717382" y="2171272"/>
+            <a:ext cx="19844" cy="1146297"/>
+          </a:xfrm>
+          <a:prstGeom prst="line">
+            <a:avLst/>
+          </a:prstGeom>
+          <a:ln w="28575">
+            <a:prstDash val="dash"/>
+          </a:ln>
+        </p:spPr>
+        <p:style>
+          <a:lnRef idx="2">
+            <a:schemeClr val="accent2"/>
+          </a:lnRef>
+          <a:fillRef idx="0">
+            <a:schemeClr val="accent2"/>
+          </a:fillRef>
+          <a:effectRef idx="1">
+            <a:schemeClr val="accent2"/>
+          </a:effectRef>
+          <a:fontRef idx="minor">
+            <a:schemeClr val="tx1"/>
+          </a:fontRef>
+        </p:style>
+      </p:cxnSp>
+      <p:cxnSp>
+        <p:nvCxnSpPr>
+          <p:cNvPr id="175" name="Conexão reta 174">
+            <a:extLst>
+              <a:ext uri="{FF2B5EF4-FFF2-40B4-BE49-F238E27FC236}">
+                <a16:creationId xmlns:a16="http://schemas.microsoft.com/office/drawing/2014/main" id="{3788107F-9AFE-4DC0-9D4A-CD48770C055E}"/>
+              </a:ext>
+            </a:extLst>
+          </p:cNvPr>
+          <p:cNvCxnSpPr>
+            <a:cxnSpLocks/>
+          </p:cNvCxnSpPr>
+          <p:nvPr/>
+        </p:nvCxnSpPr>
+        <p:spPr>
+          <a:xfrm flipH="1">
+            <a:off x="7160196" y="2171272"/>
+            <a:ext cx="619444" cy="0"/>
+          </a:xfrm>
+          <a:prstGeom prst="line">
+            <a:avLst/>
+          </a:prstGeom>
+          <a:ln w="38100"/>
+        </p:spPr>
+        <p:style>
+          <a:lnRef idx="3">
+            <a:schemeClr val="accent2"/>
+          </a:lnRef>
+          <a:fillRef idx="0">
+            <a:schemeClr val="accent2"/>
+          </a:fillRef>
+          <a:effectRef idx="2">
+            <a:schemeClr val="accent2"/>
+          </a:effectRef>
+          <a:fontRef idx="minor">
+            <a:schemeClr val="tx1"/>
+          </a:fontRef>
+        </p:style>
+      </p:cxnSp>
+      <p:cxnSp>
+        <p:nvCxnSpPr>
+          <p:cNvPr id="176" name="Conexão reta 175">
+            <a:extLst>
+              <a:ext uri="{FF2B5EF4-FFF2-40B4-BE49-F238E27FC236}">
+                <a16:creationId xmlns:a16="http://schemas.microsoft.com/office/drawing/2014/main" id="{38FD9FC9-5692-433D-8BD6-33B3C958D76E}"/>
+              </a:ext>
+            </a:extLst>
+          </p:cNvPr>
+          <p:cNvCxnSpPr>
+            <a:cxnSpLocks/>
+          </p:cNvCxnSpPr>
+          <p:nvPr/>
+        </p:nvCxnSpPr>
+        <p:spPr>
+          <a:xfrm>
+            <a:off x="7181900" y="2014982"/>
+            <a:ext cx="0" cy="156290"/>
+          </a:xfrm>
+          <a:prstGeom prst="line">
+            <a:avLst/>
+          </a:prstGeom>
+          <a:ln w="38100"/>
+        </p:spPr>
+        <p:style>
+          <a:lnRef idx="3">
+            <a:schemeClr val="accent2"/>
+          </a:lnRef>
+          <a:fillRef idx="0">
+            <a:schemeClr val="accent2"/>
+          </a:fillRef>
+          <a:effectRef idx="2">
+            <a:schemeClr val="accent2"/>
+          </a:effectRef>
+          <a:fontRef idx="minor">
+            <a:schemeClr val="tx1"/>
+          </a:fontRef>
+        </p:style>
+      </p:cxnSp>
+      <p:pic>
+        <p:nvPicPr>
+          <p:cNvPr id="134" name="Imagem 133">
+            <a:extLst>
+              <a:ext uri="{FF2B5EF4-FFF2-40B4-BE49-F238E27FC236}">
+                <a16:creationId xmlns:a16="http://schemas.microsoft.com/office/drawing/2014/main" id="{FA33B112-7742-47B0-93B4-569048077E2D}"/>
+              </a:ext>
+            </a:extLst>
+          </p:cNvPr>
+          <p:cNvPicPr>
+            <a:picLocks noChangeAspect="1"/>
+          </p:cNvPicPr>
+          <p:nvPr/>
+        </p:nvPicPr>
+        <p:blipFill>
+          <a:blip r:embed="rId3"/>
+          <a:stretch>
+            <a:fillRect/>
+          </a:stretch>
+        </p:blipFill>
+        <p:spPr>
+          <a:xfrm>
+            <a:off x="7129200" y="1950311"/>
+            <a:ext cx="110292" cy="107390"/>
+          </a:xfrm>
+          <a:prstGeom prst="rect">
+            <a:avLst/>
+          </a:prstGeom>
+        </p:spPr>
+      </p:pic>
       <p:pic>
         <p:nvPicPr>
           <p:cNvPr id="37" name="Imagem 36">
@@ -10868,8 +11073,8 @@
         </p:blipFill>
         <p:spPr>
           <a:xfrm>
-            <a:off x="6746672" y="3056670"/>
-            <a:ext cx="194577" cy="203697"/>
+            <a:off x="6994700" y="1776943"/>
+            <a:ext cx="289766" cy="303347"/>
           </a:xfrm>
           <a:prstGeom prst="rect">
             <a:avLst/>
@@ -10878,10 +11083,10 @@
       </p:pic>
       <p:sp>
         <p:nvSpPr>
-          <p:cNvPr id="133" name="Oval 132">
-            <a:extLst>
-              <a:ext uri="{FF2B5EF4-FFF2-40B4-BE49-F238E27FC236}">
-                <a16:creationId xmlns:a16="http://schemas.microsoft.com/office/drawing/2014/main" id="{2948D6F1-7584-48DF-8368-D61E0B3255F4}"/>
+          <p:cNvPr id="177" name="Oval 176">
+            <a:extLst>
+              <a:ext uri="{FF2B5EF4-FFF2-40B4-BE49-F238E27FC236}">
+                <a16:creationId xmlns:a16="http://schemas.microsoft.com/office/drawing/2014/main" id="{67D1FFEA-07EA-4B31-B84C-EBF3CB11864C}"/>
               </a:ext>
             </a:extLst>
           </p:cNvPr>
@@ -10890,8 +11095,8 @@
         </p:nvSpPr>
         <p:spPr>
           <a:xfrm>
-            <a:off x="2100473" y="-1696378"/>
-            <a:ext cx="9510266" cy="9768755"/>
+            <a:off x="2101653" y="-3153583"/>
+            <a:ext cx="10129520" cy="10315177"/>
           </a:xfrm>
           <a:prstGeom prst="ellipse">
             <a:avLst/>
@@ -10929,36 +11134,6 @@
           </a:p>
         </p:txBody>
       </p:sp>
-      <p:pic>
-        <p:nvPicPr>
-          <p:cNvPr id="134" name="Imagem 133">
-            <a:extLst>
-              <a:ext uri="{FF2B5EF4-FFF2-40B4-BE49-F238E27FC236}">
-                <a16:creationId xmlns:a16="http://schemas.microsoft.com/office/drawing/2014/main" id="{FA33B112-7742-47B0-93B4-569048077E2D}"/>
-              </a:ext>
-            </a:extLst>
-          </p:cNvPr>
-          <p:cNvPicPr>
-            <a:picLocks noChangeAspect="1"/>
-          </p:cNvPicPr>
-          <p:nvPr/>
-        </p:nvPicPr>
-        <p:blipFill>
-          <a:blip r:embed="rId3"/>
-          <a:stretch>
-            <a:fillRect/>
-          </a:stretch>
-        </p:blipFill>
-        <p:spPr>
-          <a:xfrm>
-            <a:off x="6869989" y="3183988"/>
-            <a:ext cx="110292" cy="107390"/>
-          </a:xfrm>
-          <a:prstGeom prst="rect">
-            <a:avLst/>
-          </a:prstGeom>
-        </p:spPr>
-      </p:pic>
     </p:spTree>
     <p:extLst>
       <p:ext uri="{BB962C8B-B14F-4D97-AF65-F5344CB8AC3E}">
@@ -16142,42 +16317,12 @@
           </a:prstGeom>
         </p:spPr>
       </p:pic>
-      <p:pic>
-        <p:nvPicPr>
-          <p:cNvPr id="151" name="Imagem 150">
-            <a:extLst>
-              <a:ext uri="{FF2B5EF4-FFF2-40B4-BE49-F238E27FC236}">
-                <a16:creationId xmlns:a16="http://schemas.microsoft.com/office/drawing/2014/main" id="{39F07EEE-C135-466C-BAA6-6AC0799A0450}"/>
-              </a:ext>
-            </a:extLst>
-          </p:cNvPr>
-          <p:cNvPicPr>
-            <a:picLocks noChangeAspect="1"/>
-          </p:cNvPicPr>
-          <p:nvPr/>
-        </p:nvPicPr>
-        <p:blipFill>
-          <a:blip r:embed="rId7"/>
-          <a:stretch>
-            <a:fillRect/>
-          </a:stretch>
-        </p:blipFill>
-        <p:spPr>
-          <a:xfrm>
-            <a:off x="5764708" y="4536446"/>
-            <a:ext cx="264068" cy="276445"/>
-          </a:xfrm>
-          <a:prstGeom prst="rect">
-            <a:avLst/>
-          </a:prstGeom>
-        </p:spPr>
-      </p:pic>
       <p:sp>
         <p:nvSpPr>
-          <p:cNvPr id="153" name="Oval 152">
-            <a:extLst>
-              <a:ext uri="{FF2B5EF4-FFF2-40B4-BE49-F238E27FC236}">
-                <a16:creationId xmlns:a16="http://schemas.microsoft.com/office/drawing/2014/main" id="{0787AAA0-7EB1-4AE8-AC8B-4EAB7FB1C5EC}"/>
+          <p:cNvPr id="155" name="Oval 154">
+            <a:extLst>
+              <a:ext uri="{FF2B5EF4-FFF2-40B4-BE49-F238E27FC236}">
+                <a16:creationId xmlns:a16="http://schemas.microsoft.com/office/drawing/2014/main" id="{ED7569A3-E764-4243-AF7B-77119654D2E9}"/>
               </a:ext>
             </a:extLst>
           </p:cNvPr>
@@ -16186,8 +16331,8 @@
         </p:nvSpPr>
         <p:spPr>
           <a:xfrm>
-            <a:off x="1676686" y="-53652"/>
-            <a:ext cx="8508336" cy="8597320"/>
+            <a:off x="1300480" y="-162560"/>
+            <a:ext cx="10129520" cy="10315177"/>
           </a:xfrm>
           <a:prstGeom prst="ellipse">
             <a:avLst/>
@@ -16221,10 +16366,51 @@
           <a:lstStyle/>
           <a:p>
             <a:pPr algn="ctr"/>
-            <a:endParaRPr lang="pt-PT" dirty="0"/>
+            <a:endParaRPr lang="pt-PT"/>
           </a:p>
         </p:txBody>
       </p:sp>
+      <p:cxnSp>
+        <p:nvCxnSpPr>
+          <p:cNvPr id="163" name="Conexão reta 162">
+            <a:extLst>
+              <a:ext uri="{FF2B5EF4-FFF2-40B4-BE49-F238E27FC236}">
+                <a16:creationId xmlns:a16="http://schemas.microsoft.com/office/drawing/2014/main" id="{8B292DC1-FD7B-4A65-8409-D411ABB9BAE7}"/>
+              </a:ext>
+            </a:extLst>
+          </p:cNvPr>
+          <p:cNvCxnSpPr>
+            <a:cxnSpLocks/>
+          </p:cNvCxnSpPr>
+          <p:nvPr/>
+        </p:nvCxnSpPr>
+        <p:spPr>
+          <a:xfrm flipH="1">
+            <a:off x="6096000" y="4872406"/>
+            <a:ext cx="1703244" cy="0"/>
+          </a:xfrm>
+          <a:prstGeom prst="line">
+            <a:avLst/>
+          </a:prstGeom>
+          <a:ln w="28575">
+            <a:prstDash val="dash"/>
+          </a:ln>
+        </p:spPr>
+        <p:style>
+          <a:lnRef idx="2">
+            <a:schemeClr val="accent2"/>
+          </a:lnRef>
+          <a:fillRef idx="0">
+            <a:schemeClr val="accent2"/>
+          </a:fillRef>
+          <a:effectRef idx="1">
+            <a:schemeClr val="accent2"/>
+          </a:effectRef>
+          <a:fontRef idx="minor">
+            <a:schemeClr val="tx1"/>
+          </a:fontRef>
+        </p:style>
+      </p:cxnSp>
       <p:pic>
         <p:nvPicPr>
           <p:cNvPr id="154" name="Imagem 153">
@@ -16247,8 +16433,38 @@
         </p:blipFill>
         <p:spPr>
           <a:xfrm>
-            <a:off x="5919234" y="4727060"/>
-            <a:ext cx="127520" cy="124165"/>
+            <a:off x="5985071" y="4818401"/>
+            <a:ext cx="110928" cy="108010"/>
+          </a:xfrm>
+          <a:prstGeom prst="rect">
+            <a:avLst/>
+          </a:prstGeom>
+        </p:spPr>
+      </p:pic>
+      <p:pic>
+        <p:nvPicPr>
+          <p:cNvPr id="151" name="Imagem 150">
+            <a:extLst>
+              <a:ext uri="{FF2B5EF4-FFF2-40B4-BE49-F238E27FC236}">
+                <a16:creationId xmlns:a16="http://schemas.microsoft.com/office/drawing/2014/main" id="{39F07EEE-C135-466C-BAA6-6AC0799A0450}"/>
+              </a:ext>
+            </a:extLst>
+          </p:cNvPr>
+          <p:cNvPicPr>
+            <a:picLocks noChangeAspect="1"/>
+          </p:cNvPicPr>
+          <p:nvPr/>
+        </p:nvPicPr>
+        <p:blipFill>
+          <a:blip r:embed="rId7"/>
+          <a:stretch>
+            <a:fillRect/>
+          </a:stretch>
+        </p:blipFill>
+        <p:spPr>
+          <a:xfrm>
+            <a:off x="5870293" y="4659595"/>
+            <a:ext cx="264068" cy="276445"/>
           </a:xfrm>
           <a:prstGeom prst="rect">
             <a:avLst/>

</xml_diff>

<commit_message>
Cálculo da quantidade de cabo de cobre utilizada no piso 1
</commit_message>
<xml_diff>
--- a/doc/sprint1/1201386/Cabeamento estruturado.pptx
+++ b/doc/sprint1/1201386/Cabeamento estruturado.pptx
@@ -126,7 +126,7 @@
   <pc:docChgLst>
     <pc:chgData name="Rita Sobral (1201386)" userId="a10e2ee0-50b2-4678-bcd9-890343c2a6f4" providerId="ADAL" clId="{521A3E97-D9B2-46D2-B8AE-2A70BC795E9E}"/>
     <pc:docChg chg="undo custSel addSld delSld modSld">
-      <pc:chgData name="Rita Sobral (1201386)" userId="a10e2ee0-50b2-4678-bcd9-890343c2a6f4" providerId="ADAL" clId="{521A3E97-D9B2-46D2-B8AE-2A70BC795E9E}" dt="2022-03-18T15:46:50.558" v="2195" actId="1076"/>
+      <pc:chgData name="Rita Sobral (1201386)" userId="a10e2ee0-50b2-4678-bcd9-890343c2a6f4" providerId="ADAL" clId="{521A3E97-D9B2-46D2-B8AE-2A70BC795E9E}" dt="2022-03-19T02:10:59.103" v="2196" actId="1076"/>
       <pc:docMkLst>
         <pc:docMk/>
       </pc:docMkLst>
@@ -1714,7 +1714,7 @@
         </pc:cxnChg>
       </pc:sldChg>
       <pc:sldChg chg="addSp delSp modSp mod">
-        <pc:chgData name="Rita Sobral (1201386)" userId="a10e2ee0-50b2-4678-bcd9-890343c2a6f4" providerId="ADAL" clId="{521A3E97-D9B2-46D2-B8AE-2A70BC795E9E}" dt="2022-03-18T15:46:21.722" v="2192" actId="14100"/>
+        <pc:chgData name="Rita Sobral (1201386)" userId="a10e2ee0-50b2-4678-bcd9-890343c2a6f4" providerId="ADAL" clId="{521A3E97-D9B2-46D2-B8AE-2A70BC795E9E}" dt="2022-03-19T02:10:59.103" v="2196" actId="1076"/>
         <pc:sldMkLst>
           <pc:docMk/>
           <pc:sldMk cId="1211775621" sldId="257"/>
@@ -1944,7 +1944,7 @@
           </ac:picMkLst>
         </pc:picChg>
         <pc:picChg chg="add mod ord">
-          <ac:chgData name="Rita Sobral (1201386)" userId="a10e2ee0-50b2-4678-bcd9-890343c2a6f4" providerId="ADAL" clId="{521A3E97-D9B2-46D2-B8AE-2A70BC795E9E}" dt="2022-03-14T16:50:41.616" v="1207" actId="166"/>
+          <ac:chgData name="Rita Sobral (1201386)" userId="a10e2ee0-50b2-4678-bcd9-890343c2a6f4" providerId="ADAL" clId="{521A3E97-D9B2-46D2-B8AE-2A70BC795E9E}" dt="2022-03-19T02:10:59.103" v="2196" actId="1076"/>
           <ac:picMkLst>
             <pc:docMk/>
             <pc:sldMk cId="1211775621" sldId="257"/>
@@ -3511,7 +3511,7 @@
           <a:p>
             <a:fld id="{8F82C252-1427-4D8D-AB30-AD263CCB5166}" type="datetimeFigureOut">
               <a:rPr lang="pt-PT" smtClean="0"/>
-              <a:t>18/03/2022</a:t>
+              <a:t>19/03/2022</a:t>
             </a:fld>
             <a:endParaRPr lang="pt-PT"/>
           </a:p>
@@ -3709,7 +3709,7 @@
           <a:p>
             <a:fld id="{8F82C252-1427-4D8D-AB30-AD263CCB5166}" type="datetimeFigureOut">
               <a:rPr lang="pt-PT" smtClean="0"/>
-              <a:t>18/03/2022</a:t>
+              <a:t>19/03/2022</a:t>
             </a:fld>
             <a:endParaRPr lang="pt-PT"/>
           </a:p>
@@ -3917,7 +3917,7 @@
           <a:p>
             <a:fld id="{8F82C252-1427-4D8D-AB30-AD263CCB5166}" type="datetimeFigureOut">
               <a:rPr lang="pt-PT" smtClean="0"/>
-              <a:t>18/03/2022</a:t>
+              <a:t>19/03/2022</a:t>
             </a:fld>
             <a:endParaRPr lang="pt-PT"/>
           </a:p>
@@ -4115,7 +4115,7 @@
           <a:p>
             <a:fld id="{8F82C252-1427-4D8D-AB30-AD263CCB5166}" type="datetimeFigureOut">
               <a:rPr lang="pt-PT" smtClean="0"/>
-              <a:t>18/03/2022</a:t>
+              <a:t>19/03/2022</a:t>
             </a:fld>
             <a:endParaRPr lang="pt-PT"/>
           </a:p>
@@ -4390,7 +4390,7 @@
           <a:p>
             <a:fld id="{8F82C252-1427-4D8D-AB30-AD263CCB5166}" type="datetimeFigureOut">
               <a:rPr lang="pt-PT" smtClean="0"/>
-              <a:t>18/03/2022</a:t>
+              <a:t>19/03/2022</a:t>
             </a:fld>
             <a:endParaRPr lang="pt-PT"/>
           </a:p>
@@ -4655,7 +4655,7 @@
           <a:p>
             <a:fld id="{8F82C252-1427-4D8D-AB30-AD263CCB5166}" type="datetimeFigureOut">
               <a:rPr lang="pt-PT" smtClean="0"/>
-              <a:t>18/03/2022</a:t>
+              <a:t>19/03/2022</a:t>
             </a:fld>
             <a:endParaRPr lang="pt-PT"/>
           </a:p>
@@ -5067,7 +5067,7 @@
           <a:p>
             <a:fld id="{8F82C252-1427-4D8D-AB30-AD263CCB5166}" type="datetimeFigureOut">
               <a:rPr lang="pt-PT" smtClean="0"/>
-              <a:t>18/03/2022</a:t>
+              <a:t>19/03/2022</a:t>
             </a:fld>
             <a:endParaRPr lang="pt-PT"/>
           </a:p>
@@ -5208,7 +5208,7 @@
           <a:p>
             <a:fld id="{8F82C252-1427-4D8D-AB30-AD263CCB5166}" type="datetimeFigureOut">
               <a:rPr lang="pt-PT" smtClean="0"/>
-              <a:t>18/03/2022</a:t>
+              <a:t>19/03/2022</a:t>
             </a:fld>
             <a:endParaRPr lang="pt-PT"/>
           </a:p>
@@ -5321,7 +5321,7 @@
           <a:p>
             <a:fld id="{8F82C252-1427-4D8D-AB30-AD263CCB5166}" type="datetimeFigureOut">
               <a:rPr lang="pt-PT" smtClean="0"/>
-              <a:t>18/03/2022</a:t>
+              <a:t>19/03/2022</a:t>
             </a:fld>
             <a:endParaRPr lang="pt-PT"/>
           </a:p>
@@ -5632,7 +5632,7 @@
           <a:p>
             <a:fld id="{8F82C252-1427-4D8D-AB30-AD263CCB5166}" type="datetimeFigureOut">
               <a:rPr lang="pt-PT" smtClean="0"/>
-              <a:t>18/03/2022</a:t>
+              <a:t>19/03/2022</a:t>
             </a:fld>
             <a:endParaRPr lang="pt-PT"/>
           </a:p>
@@ -5920,7 +5920,7 @@
           <a:p>
             <a:fld id="{8F82C252-1427-4D8D-AB30-AD263CCB5166}" type="datetimeFigureOut">
               <a:rPr lang="pt-PT" smtClean="0"/>
-              <a:t>18/03/2022</a:t>
+              <a:t>19/03/2022</a:t>
             </a:fld>
             <a:endParaRPr lang="pt-PT"/>
           </a:p>
@@ -6161,7 +6161,7 @@
           <a:p>
             <a:fld id="{8F82C252-1427-4D8D-AB30-AD263CCB5166}" type="datetimeFigureOut">
               <a:rPr lang="pt-PT" smtClean="0"/>
-              <a:t>18/03/2022</a:t>
+              <a:t>19/03/2022</a:t>
             </a:fld>
             <a:endParaRPr lang="pt-PT"/>
           </a:p>
@@ -15379,7 +15379,7 @@
         </p:blipFill>
         <p:spPr>
           <a:xfrm>
-            <a:off x="7519327" y="5176448"/>
+            <a:off x="7515720" y="5085218"/>
             <a:ext cx="166728" cy="162341"/>
           </a:xfrm>
           <a:prstGeom prst="rect">

</xml_diff>

<commit_message>
Determinação dos tamanhos de cada armário
</commit_message>
<xml_diff>
--- a/doc/sprint1/1201386/Cabeamento estruturado.pptx
+++ b/doc/sprint1/1201386/Cabeamento estruturado.pptx
@@ -126,12 +126,12 @@
   <pc:docChgLst>
     <pc:chgData name="Rita Sobral (1201386)" userId="a10e2ee0-50b2-4678-bcd9-890343c2a6f4" providerId="ADAL" clId="{521A3E97-D9B2-46D2-B8AE-2A70BC795E9E}"/>
     <pc:docChg chg="undo custSel addSld delSld modSld">
-      <pc:chgData name="Rita Sobral (1201386)" userId="a10e2ee0-50b2-4678-bcd9-890343c2a6f4" providerId="ADAL" clId="{521A3E97-D9B2-46D2-B8AE-2A70BC795E9E}" dt="2022-03-19T02:10:59.103" v="2196" actId="1076"/>
+      <pc:chgData name="Rita Sobral (1201386)" userId="a10e2ee0-50b2-4678-bcd9-890343c2a6f4" providerId="ADAL" clId="{521A3E97-D9B2-46D2-B8AE-2A70BC795E9E}" dt="2022-03-19T11:33:19.694" v="2200" actId="166"/>
       <pc:docMkLst>
         <pc:docMk/>
       </pc:docMkLst>
       <pc:sldChg chg="addSp delSp modSp mod">
-        <pc:chgData name="Rita Sobral (1201386)" userId="a10e2ee0-50b2-4678-bcd9-890343c2a6f4" providerId="ADAL" clId="{521A3E97-D9B2-46D2-B8AE-2A70BC795E9E}" dt="2022-03-18T15:46:50.558" v="2195" actId="1076"/>
+        <pc:chgData name="Rita Sobral (1201386)" userId="a10e2ee0-50b2-4678-bcd9-890343c2a6f4" providerId="ADAL" clId="{521A3E97-D9B2-46D2-B8AE-2A70BC795E9E}" dt="2022-03-19T11:33:19.694" v="2200" actId="166"/>
         <pc:sldMkLst>
           <pc:docMk/>
           <pc:sldMk cId="212155394" sldId="256"/>
@@ -184,8 +184,8 @@
             <ac:spMk id="133" creationId="{2948D6F1-7584-48DF-8368-D61E0B3255F4}"/>
           </ac:spMkLst>
         </pc:spChg>
-        <pc:spChg chg="add mod">
-          <ac:chgData name="Rita Sobral (1201386)" userId="a10e2ee0-50b2-4678-bcd9-890343c2a6f4" providerId="ADAL" clId="{521A3E97-D9B2-46D2-B8AE-2A70BC795E9E}" dt="2022-03-18T15:46:50.558" v="2195" actId="1076"/>
+        <pc:spChg chg="add mod ord">
+          <ac:chgData name="Rita Sobral (1201386)" userId="a10e2ee0-50b2-4678-bcd9-890343c2a6f4" providerId="ADAL" clId="{521A3E97-D9B2-46D2-B8AE-2A70BC795E9E}" dt="2022-03-19T11:33:19.694" v="2200" actId="166"/>
           <ac:spMkLst>
             <pc:docMk/>
             <pc:sldMk cId="212155394" sldId="256"/>
@@ -200,8 +200,8 @@
             <ac:picMk id="2" creationId="{640A730E-44C0-481E-8B10-7AB5867A7767}"/>
           </ac:picMkLst>
         </pc:picChg>
-        <pc:picChg chg="add mod">
-          <ac:chgData name="Rita Sobral (1201386)" userId="a10e2ee0-50b2-4678-bcd9-890343c2a6f4" providerId="ADAL" clId="{521A3E97-D9B2-46D2-B8AE-2A70BC795E9E}" dt="2022-03-15T23:30:20.975" v="1720" actId="1076"/>
+        <pc:picChg chg="add mod ord">
+          <ac:chgData name="Rita Sobral (1201386)" userId="a10e2ee0-50b2-4678-bcd9-890343c2a6f4" providerId="ADAL" clId="{521A3E97-D9B2-46D2-B8AE-2A70BC795E9E}" dt="2022-03-19T11:32:22.290" v="2198" actId="166"/>
           <ac:picMkLst>
             <pc:docMk/>
             <pc:sldMk cId="212155394" sldId="256"/>

</xml_diff>

<commit_message>
Adição da legenda e contabilização dos patch cords
</commit_message>
<xml_diff>
--- a/doc/sprint1/1201386/Cabeamento estruturado.pptx
+++ b/doc/sprint1/1201386/Cabeamento estruturado.pptx
@@ -7,6 +7,7 @@
   <p:sldIdLst>
     <p:sldId id="256" r:id="rId2"/>
     <p:sldId id="257" r:id="rId3"/>
+    <p:sldId id="258" r:id="rId4"/>
   </p:sldIdLst>
   <p:sldSz cx="12192000" cy="6858000"/>
   <p:notesSz cx="6858000" cy="9144000"/>
@@ -116,7 +117,7 @@
 <file path=ppt/revisionInfo.xml><?xml version="1.0" encoding="utf-8"?>
 <p1510:revInfo xmlns:a="http://schemas.openxmlformats.org/drawingml/2006/main" xmlns:r="http://schemas.openxmlformats.org/officeDocument/2006/relationships" xmlns:p1510="http://schemas.microsoft.com/office/powerpoint/2015/10/main">
   <p1510:revLst>
-    <p1510:client id="{521A3E97-D9B2-46D2-B8AE-2A70BC795E9E}" v="418" dt="2022-03-18T15:46:33.036"/>
+    <p1510:client id="{521A3E97-D9B2-46D2-B8AE-2A70BC795E9E}" v="463" dt="2022-03-20T14:38:40.495"/>
   </p1510:revLst>
 </p1510:revInfo>
 </file>
@@ -125,8 +126,8 @@
 <pc:chgInfo xmlns:a="http://schemas.openxmlformats.org/drawingml/2006/main" xmlns:r="http://schemas.openxmlformats.org/officeDocument/2006/relationships" xmlns:ac="http://schemas.microsoft.com/office/drawing/2013/main/command" xmlns:pc="http://schemas.microsoft.com/office/powerpoint/2013/main/command">
   <pc:docChgLst>
     <pc:chgData name="Rita Sobral (1201386)" userId="a10e2ee0-50b2-4678-bcd9-890343c2a6f4" providerId="ADAL" clId="{521A3E97-D9B2-46D2-B8AE-2A70BC795E9E}"/>
-    <pc:docChg chg="undo custSel addSld delSld modSld">
-      <pc:chgData name="Rita Sobral (1201386)" userId="a10e2ee0-50b2-4678-bcd9-890343c2a6f4" providerId="ADAL" clId="{521A3E97-D9B2-46D2-B8AE-2A70BC795E9E}" dt="2022-03-19T11:33:19.694" v="2200" actId="166"/>
+    <pc:docChg chg="undo redo custSel addSld delSld modSld">
+      <pc:chgData name="Rita Sobral (1201386)" userId="a10e2ee0-50b2-4678-bcd9-890343c2a6f4" providerId="ADAL" clId="{521A3E97-D9B2-46D2-B8AE-2A70BC795E9E}" dt="2022-03-20T14:38:58.910" v="2705" actId="1076"/>
       <pc:docMkLst>
         <pc:docMk/>
       </pc:docMkLst>
@@ -3358,6 +3359,309 @@
             <ac:picMk id="5" creationId="{F618D518-5CD7-4EB0-A651-348932F4CE81}"/>
           </ac:picMkLst>
         </pc:picChg>
+      </pc:sldChg>
+      <pc:sldChg chg="addSp delSp modSp new mod">
+        <pc:chgData name="Rita Sobral (1201386)" userId="a10e2ee0-50b2-4678-bcd9-890343c2a6f4" providerId="ADAL" clId="{521A3E97-D9B2-46D2-B8AE-2A70BC795E9E}" dt="2022-03-20T14:38:58.910" v="2705" actId="1076"/>
+        <pc:sldMkLst>
+          <pc:docMk/>
+          <pc:sldMk cId="2607341909" sldId="258"/>
+        </pc:sldMkLst>
+        <pc:spChg chg="add del mod">
+          <ac:chgData name="Rita Sobral (1201386)" userId="a10e2ee0-50b2-4678-bcd9-890343c2a6f4" providerId="ADAL" clId="{521A3E97-D9B2-46D2-B8AE-2A70BC795E9E}" dt="2022-03-20T14:12:42.902" v="2247" actId="478"/>
+          <ac:spMkLst>
+            <pc:docMk/>
+            <pc:sldMk cId="2607341909" sldId="258"/>
+            <ac:spMk id="11" creationId="{6F98774E-CC88-4BDB-B3B9-CCF776571EA0}"/>
+          </ac:spMkLst>
+        </pc:spChg>
+        <pc:spChg chg="add del mod">
+          <ac:chgData name="Rita Sobral (1201386)" userId="a10e2ee0-50b2-4678-bcd9-890343c2a6f4" providerId="ADAL" clId="{521A3E97-D9B2-46D2-B8AE-2A70BC795E9E}" dt="2022-03-20T14:37:09.838" v="2682" actId="478"/>
+          <ac:spMkLst>
+            <pc:docMk/>
+            <pc:sldMk cId="2607341909" sldId="258"/>
+            <ac:spMk id="12" creationId="{4FA6CA71-E380-4361-AEEC-D288441312D0}"/>
+          </ac:spMkLst>
+        </pc:spChg>
+        <pc:spChg chg="add del mod">
+          <ac:chgData name="Rita Sobral (1201386)" userId="a10e2ee0-50b2-4678-bcd9-890343c2a6f4" providerId="ADAL" clId="{521A3E97-D9B2-46D2-B8AE-2A70BC795E9E}" dt="2022-03-20T14:37:05.814" v="2680" actId="478"/>
+          <ac:spMkLst>
+            <pc:docMk/>
+            <pc:sldMk cId="2607341909" sldId="258"/>
+            <ac:spMk id="14" creationId="{0D0F3FE2-F942-4D55-9991-95BF189703E7}"/>
+          </ac:spMkLst>
+        </pc:spChg>
+        <pc:spChg chg="add del mod">
+          <ac:chgData name="Rita Sobral (1201386)" userId="a10e2ee0-50b2-4678-bcd9-890343c2a6f4" providerId="ADAL" clId="{521A3E97-D9B2-46D2-B8AE-2A70BC795E9E}" dt="2022-03-20T14:23:39.701" v="2440" actId="21"/>
+          <ac:spMkLst>
+            <pc:docMk/>
+            <pc:sldMk cId="2607341909" sldId="258"/>
+            <ac:spMk id="16" creationId="{639ECB3C-B68C-4F4A-BB49-9278E90A2253}"/>
+          </ac:spMkLst>
+        </pc:spChg>
+        <pc:spChg chg="add del mod">
+          <ac:chgData name="Rita Sobral (1201386)" userId="a10e2ee0-50b2-4678-bcd9-890343c2a6f4" providerId="ADAL" clId="{521A3E97-D9B2-46D2-B8AE-2A70BC795E9E}" dt="2022-03-20T14:37:05.814" v="2680" actId="478"/>
+          <ac:spMkLst>
+            <pc:docMk/>
+            <pc:sldMk cId="2607341909" sldId="258"/>
+            <ac:spMk id="17" creationId="{2BA68FA9-6622-4D21-ACCA-DDB7D7F14784}"/>
+          </ac:spMkLst>
+        </pc:spChg>
+        <pc:spChg chg="add del mod">
+          <ac:chgData name="Rita Sobral (1201386)" userId="a10e2ee0-50b2-4678-bcd9-890343c2a6f4" providerId="ADAL" clId="{521A3E97-D9B2-46D2-B8AE-2A70BC795E9E}" dt="2022-03-20T14:37:05.814" v="2680" actId="478"/>
+          <ac:spMkLst>
+            <pc:docMk/>
+            <pc:sldMk cId="2607341909" sldId="258"/>
+            <ac:spMk id="18" creationId="{93E8B452-4273-4637-857F-7F8329B9952A}"/>
+          </ac:spMkLst>
+        </pc:spChg>
+        <pc:spChg chg="add del mod">
+          <ac:chgData name="Rita Sobral (1201386)" userId="a10e2ee0-50b2-4678-bcd9-890343c2a6f4" providerId="ADAL" clId="{521A3E97-D9B2-46D2-B8AE-2A70BC795E9E}" dt="2022-03-20T14:37:05.814" v="2680" actId="478"/>
+          <ac:spMkLst>
+            <pc:docMk/>
+            <pc:sldMk cId="2607341909" sldId="258"/>
+            <ac:spMk id="21" creationId="{185F5237-F782-4480-B0A5-2461443908C0}"/>
+          </ac:spMkLst>
+        </pc:spChg>
+        <pc:spChg chg="add del mod">
+          <ac:chgData name="Rita Sobral (1201386)" userId="a10e2ee0-50b2-4678-bcd9-890343c2a6f4" providerId="ADAL" clId="{521A3E97-D9B2-46D2-B8AE-2A70BC795E9E}" dt="2022-03-20T14:37:05.814" v="2680" actId="478"/>
+          <ac:spMkLst>
+            <pc:docMk/>
+            <pc:sldMk cId="2607341909" sldId="258"/>
+            <ac:spMk id="22" creationId="{9AE4DD97-B8EA-481F-8F57-F5FAB4A27456}"/>
+          </ac:spMkLst>
+        </pc:spChg>
+        <pc:spChg chg="add del mod">
+          <ac:chgData name="Rita Sobral (1201386)" userId="a10e2ee0-50b2-4678-bcd9-890343c2a6f4" providerId="ADAL" clId="{521A3E97-D9B2-46D2-B8AE-2A70BC795E9E}" dt="2022-03-20T14:23:29.742" v="2437" actId="21"/>
+          <ac:spMkLst>
+            <pc:docMk/>
+            <pc:sldMk cId="2607341909" sldId="258"/>
+            <ac:spMk id="23" creationId="{D0DB1AF1-9C17-4E5C-84A5-E6029EE27C9B}"/>
+          </ac:spMkLst>
+        </pc:spChg>
+        <pc:spChg chg="add del mod">
+          <ac:chgData name="Rita Sobral (1201386)" userId="a10e2ee0-50b2-4678-bcd9-890343c2a6f4" providerId="ADAL" clId="{521A3E97-D9B2-46D2-B8AE-2A70BC795E9E}" dt="2022-03-20T14:29:51.905" v="2576" actId="21"/>
+          <ac:spMkLst>
+            <pc:docMk/>
+            <pc:sldMk cId="2607341909" sldId="258"/>
+            <ac:spMk id="26" creationId="{C201DA7D-2B72-41D2-80CF-77A1DB495754}"/>
+          </ac:spMkLst>
+        </pc:spChg>
+        <pc:spChg chg="add del mod">
+          <ac:chgData name="Rita Sobral (1201386)" userId="a10e2ee0-50b2-4678-bcd9-890343c2a6f4" providerId="ADAL" clId="{521A3E97-D9B2-46D2-B8AE-2A70BC795E9E}" dt="2022-03-20T14:37:13.569" v="2684" actId="21"/>
+          <ac:spMkLst>
+            <pc:docMk/>
+            <pc:sldMk cId="2607341909" sldId="258"/>
+            <ac:spMk id="27" creationId="{932B6F42-0F45-4B67-B34B-F14113CFDB28}"/>
+          </ac:spMkLst>
+        </pc:spChg>
+        <pc:spChg chg="add del mod">
+          <ac:chgData name="Rita Sobral (1201386)" userId="a10e2ee0-50b2-4678-bcd9-890343c2a6f4" providerId="ADAL" clId="{521A3E97-D9B2-46D2-B8AE-2A70BC795E9E}" dt="2022-03-20T14:37:05.814" v="2680" actId="478"/>
+          <ac:spMkLst>
+            <pc:docMk/>
+            <pc:sldMk cId="2607341909" sldId="258"/>
+            <ac:spMk id="28" creationId="{A0379EE4-A7A3-4C26-A4F6-EFD69B7686D7}"/>
+          </ac:spMkLst>
+        </pc:spChg>
+        <pc:spChg chg="add del mod">
+          <ac:chgData name="Rita Sobral (1201386)" userId="a10e2ee0-50b2-4678-bcd9-890343c2a6f4" providerId="ADAL" clId="{521A3E97-D9B2-46D2-B8AE-2A70BC795E9E}" dt="2022-03-20T14:37:05.814" v="2680" actId="478"/>
+          <ac:spMkLst>
+            <pc:docMk/>
+            <pc:sldMk cId="2607341909" sldId="258"/>
+            <ac:spMk id="29" creationId="{66D55D78-AD5C-410B-AFD0-5AF619888CF9}"/>
+          </ac:spMkLst>
+        </pc:spChg>
+        <pc:spChg chg="add del mod">
+          <ac:chgData name="Rita Sobral (1201386)" userId="a10e2ee0-50b2-4678-bcd9-890343c2a6f4" providerId="ADAL" clId="{521A3E97-D9B2-46D2-B8AE-2A70BC795E9E}" dt="2022-03-20T14:37:05.814" v="2680" actId="478"/>
+          <ac:spMkLst>
+            <pc:docMk/>
+            <pc:sldMk cId="2607341909" sldId="258"/>
+            <ac:spMk id="34" creationId="{CA1EFC66-ADEA-4554-AC90-9E0E711EFA7B}"/>
+          </ac:spMkLst>
+        </pc:spChg>
+        <pc:spChg chg="add del mod">
+          <ac:chgData name="Rita Sobral (1201386)" userId="a10e2ee0-50b2-4678-bcd9-890343c2a6f4" providerId="ADAL" clId="{521A3E97-D9B2-46D2-B8AE-2A70BC795E9E}" dt="2022-03-20T14:29:55.568" v="2578"/>
+          <ac:spMkLst>
+            <pc:docMk/>
+            <pc:sldMk cId="2607341909" sldId="258"/>
+            <ac:spMk id="35" creationId="{E29468F0-FBD7-4FF2-937F-4E32C6676944}"/>
+          </ac:spMkLst>
+        </pc:spChg>
+        <pc:spChg chg="add del mod">
+          <ac:chgData name="Rita Sobral (1201386)" userId="a10e2ee0-50b2-4678-bcd9-890343c2a6f4" providerId="ADAL" clId="{521A3E97-D9B2-46D2-B8AE-2A70BC795E9E}" dt="2022-03-20T14:37:05.814" v="2680" actId="478"/>
+          <ac:spMkLst>
+            <pc:docMk/>
+            <pc:sldMk cId="2607341909" sldId="258"/>
+            <ac:spMk id="36" creationId="{39B138E3-81D7-411B-AC7D-159A110FDA02}"/>
+          </ac:spMkLst>
+        </pc:spChg>
+        <pc:spChg chg="add mod">
+          <ac:chgData name="Rita Sobral (1201386)" userId="a10e2ee0-50b2-4678-bcd9-890343c2a6f4" providerId="ADAL" clId="{521A3E97-D9B2-46D2-B8AE-2A70BC795E9E}" dt="2022-03-20T14:38:16.939" v="2693" actId="1582"/>
+          <ac:spMkLst>
+            <pc:docMk/>
+            <pc:sldMk cId="2607341909" sldId="258"/>
+            <ac:spMk id="39" creationId="{CB3C094D-7E68-47B8-BC7B-D18095478485}"/>
+          </ac:spMkLst>
+        </pc:spChg>
+        <pc:spChg chg="add mod">
+          <ac:chgData name="Rita Sobral (1201386)" userId="a10e2ee0-50b2-4678-bcd9-890343c2a6f4" providerId="ADAL" clId="{521A3E97-D9B2-46D2-B8AE-2A70BC795E9E}" dt="2022-03-20T14:38:31.837" v="2697" actId="14100"/>
+          <ac:spMkLst>
+            <pc:docMk/>
+            <pc:sldMk cId="2607341909" sldId="258"/>
+            <ac:spMk id="40" creationId="{DA4410FD-9C80-4D37-9F7C-676DE426D603}"/>
+          </ac:spMkLst>
+        </pc:spChg>
+        <pc:picChg chg="add del mod modCrop">
+          <ac:chgData name="Rita Sobral (1201386)" userId="a10e2ee0-50b2-4678-bcd9-890343c2a6f4" providerId="ADAL" clId="{521A3E97-D9B2-46D2-B8AE-2A70BC795E9E}" dt="2022-03-20T14:37:05.814" v="2680" actId="478"/>
+          <ac:picMkLst>
+            <pc:docMk/>
+            <pc:sldMk cId="2607341909" sldId="258"/>
+            <ac:picMk id="3" creationId="{C7DA2A53-5226-478E-A1CF-369197217667}"/>
+          </ac:picMkLst>
+        </pc:picChg>
+        <pc:picChg chg="add del mod">
+          <ac:chgData name="Rita Sobral (1201386)" userId="a10e2ee0-50b2-4678-bcd9-890343c2a6f4" providerId="ADAL" clId="{521A3E97-D9B2-46D2-B8AE-2A70BC795E9E}" dt="2022-03-20T14:37:05.814" v="2680" actId="478"/>
+          <ac:picMkLst>
+            <pc:docMk/>
+            <pc:sldMk cId="2607341909" sldId="258"/>
+            <ac:picMk id="4" creationId="{FD26A7CE-BCD7-4CCB-8175-C466B6FA2E16}"/>
+          </ac:picMkLst>
+        </pc:picChg>
+        <pc:picChg chg="add del mod">
+          <ac:chgData name="Rita Sobral (1201386)" userId="a10e2ee0-50b2-4678-bcd9-890343c2a6f4" providerId="ADAL" clId="{521A3E97-D9B2-46D2-B8AE-2A70BC795E9E}" dt="2022-03-20T14:37:05.814" v="2680" actId="478"/>
+          <ac:picMkLst>
+            <pc:docMk/>
+            <pc:sldMk cId="2607341909" sldId="258"/>
+            <ac:picMk id="5" creationId="{2BCBBC3F-DDB0-45E2-AED7-C0B38A1AD173}"/>
+          </ac:picMkLst>
+        </pc:picChg>
+        <pc:picChg chg="add del mod">
+          <ac:chgData name="Rita Sobral (1201386)" userId="a10e2ee0-50b2-4678-bcd9-890343c2a6f4" providerId="ADAL" clId="{521A3E97-D9B2-46D2-B8AE-2A70BC795E9E}" dt="2022-03-20T14:17:13.067" v="2338" actId="478"/>
+          <ac:picMkLst>
+            <pc:docMk/>
+            <pc:sldMk cId="2607341909" sldId="258"/>
+            <ac:picMk id="6" creationId="{2FE4BBA6-EE27-420C-9784-A80DCFDA282D}"/>
+          </ac:picMkLst>
+        </pc:picChg>
+        <pc:picChg chg="add del mod">
+          <ac:chgData name="Rita Sobral (1201386)" userId="a10e2ee0-50b2-4678-bcd9-890343c2a6f4" providerId="ADAL" clId="{521A3E97-D9B2-46D2-B8AE-2A70BC795E9E}" dt="2022-03-20T14:37:05.814" v="2680" actId="478"/>
+          <ac:picMkLst>
+            <pc:docMk/>
+            <pc:sldMk cId="2607341909" sldId="258"/>
+            <ac:picMk id="7" creationId="{8AB30589-EF58-4D3B-A9F0-400AA8663E3A}"/>
+          </ac:picMkLst>
+        </pc:picChg>
+        <pc:picChg chg="add del mod">
+          <ac:chgData name="Rita Sobral (1201386)" userId="a10e2ee0-50b2-4678-bcd9-890343c2a6f4" providerId="ADAL" clId="{521A3E97-D9B2-46D2-B8AE-2A70BC795E9E}" dt="2022-03-20T14:19:06.413" v="2368" actId="478"/>
+          <ac:picMkLst>
+            <pc:docMk/>
+            <pc:sldMk cId="2607341909" sldId="258"/>
+            <ac:picMk id="8" creationId="{531B3EBF-2381-4F97-A4E9-3A83342763EC}"/>
+          </ac:picMkLst>
+        </pc:picChg>
+        <pc:picChg chg="add del mod">
+          <ac:chgData name="Rita Sobral (1201386)" userId="a10e2ee0-50b2-4678-bcd9-890343c2a6f4" providerId="ADAL" clId="{521A3E97-D9B2-46D2-B8AE-2A70BC795E9E}" dt="2022-03-20T14:23:23.100" v="2436" actId="478"/>
+          <ac:picMkLst>
+            <pc:docMk/>
+            <pc:sldMk cId="2607341909" sldId="258"/>
+            <ac:picMk id="9" creationId="{9B90503B-D392-48DE-88FF-4E9902E157F8}"/>
+          </ac:picMkLst>
+        </pc:picChg>
+        <pc:picChg chg="add del mod">
+          <ac:chgData name="Rita Sobral (1201386)" userId="a10e2ee0-50b2-4678-bcd9-890343c2a6f4" providerId="ADAL" clId="{521A3E97-D9B2-46D2-B8AE-2A70BC795E9E}" dt="2022-03-20T14:23:31.491" v="2438" actId="478"/>
+          <ac:picMkLst>
+            <pc:docMk/>
+            <pc:sldMk cId="2607341909" sldId="258"/>
+            <ac:picMk id="10" creationId="{94073A01-8E73-4CB7-9980-F2D3790CA76E}"/>
+          </ac:picMkLst>
+        </pc:picChg>
+        <pc:picChg chg="add del mod ord">
+          <ac:chgData name="Rita Sobral (1201386)" userId="a10e2ee0-50b2-4678-bcd9-890343c2a6f4" providerId="ADAL" clId="{521A3E97-D9B2-46D2-B8AE-2A70BC795E9E}" dt="2022-03-20T14:23:36.995" v="2439" actId="21"/>
+          <ac:picMkLst>
+            <pc:docMk/>
+            <pc:sldMk cId="2607341909" sldId="258"/>
+            <ac:picMk id="13" creationId="{15BF5B62-2D97-41D1-B383-18F66B98289C}"/>
+          </ac:picMkLst>
+        </pc:picChg>
+        <pc:picChg chg="add del mod">
+          <ac:chgData name="Rita Sobral (1201386)" userId="a10e2ee0-50b2-4678-bcd9-890343c2a6f4" providerId="ADAL" clId="{521A3E97-D9B2-46D2-B8AE-2A70BC795E9E}" dt="2022-03-20T14:16:31.495" v="2297" actId="478"/>
+          <ac:picMkLst>
+            <pc:docMk/>
+            <pc:sldMk cId="2607341909" sldId="258"/>
+            <ac:picMk id="15" creationId="{ADB9BB37-82CC-49CD-BC4C-C6DC3A317A56}"/>
+          </ac:picMkLst>
+        </pc:picChg>
+        <pc:picChg chg="add del mod">
+          <ac:chgData name="Rita Sobral (1201386)" userId="a10e2ee0-50b2-4678-bcd9-890343c2a6f4" providerId="ADAL" clId="{521A3E97-D9B2-46D2-B8AE-2A70BC795E9E}" dt="2022-03-20T14:37:05.814" v="2680" actId="478"/>
+          <ac:picMkLst>
+            <pc:docMk/>
+            <pc:sldMk cId="2607341909" sldId="258"/>
+            <ac:picMk id="19" creationId="{B58E64C9-4AEB-415F-B89B-A9421E009471}"/>
+          </ac:picMkLst>
+        </pc:picChg>
+        <pc:picChg chg="add del mod">
+          <ac:chgData name="Rita Sobral (1201386)" userId="a10e2ee0-50b2-4678-bcd9-890343c2a6f4" providerId="ADAL" clId="{521A3E97-D9B2-46D2-B8AE-2A70BC795E9E}" dt="2022-03-20T14:19:33.247" v="2374" actId="478"/>
+          <ac:picMkLst>
+            <pc:docMk/>
+            <pc:sldMk cId="2607341909" sldId="258"/>
+            <ac:picMk id="20" creationId="{8F9FE01E-22E1-45E5-B121-6EEC3184710F}"/>
+          </ac:picMkLst>
+        </pc:picChg>
+        <pc:picChg chg="add mod">
+          <ac:chgData name="Rita Sobral (1201386)" userId="a10e2ee0-50b2-4678-bcd9-890343c2a6f4" providerId="ADAL" clId="{521A3E97-D9B2-46D2-B8AE-2A70BC795E9E}" dt="2022-03-20T14:37:29.040" v="2686" actId="1076"/>
+          <ac:picMkLst>
+            <pc:docMk/>
+            <pc:sldMk cId="2607341909" sldId="258"/>
+            <ac:picMk id="38" creationId="{BEDCDCF9-77FB-48C7-86FA-103768F0C90A}"/>
+          </ac:picMkLst>
+        </pc:picChg>
+        <pc:picChg chg="add mod">
+          <ac:chgData name="Rita Sobral (1201386)" userId="a10e2ee0-50b2-4678-bcd9-890343c2a6f4" providerId="ADAL" clId="{521A3E97-D9B2-46D2-B8AE-2A70BC795E9E}" dt="2022-03-20T14:38:58.910" v="2705" actId="1076"/>
+          <ac:picMkLst>
+            <pc:docMk/>
+            <pc:sldMk cId="2607341909" sldId="258"/>
+            <ac:picMk id="42" creationId="{19DA4B49-6B45-4114-AEAB-2DE2EB403F17}"/>
+          </ac:picMkLst>
+        </pc:picChg>
+        <pc:cxnChg chg="add del mod">
+          <ac:chgData name="Rita Sobral (1201386)" userId="a10e2ee0-50b2-4678-bcd9-890343c2a6f4" providerId="ADAL" clId="{521A3E97-D9B2-46D2-B8AE-2A70BC795E9E}" dt="2022-03-20T14:37:05.814" v="2680" actId="478"/>
+          <ac:cxnSpMkLst>
+            <pc:docMk/>
+            <pc:sldMk cId="2607341909" sldId="258"/>
+            <ac:cxnSpMk id="24" creationId="{B2C96069-C195-4CAF-94D8-1A28355C09AA}"/>
+          </ac:cxnSpMkLst>
+        </pc:cxnChg>
+        <pc:cxnChg chg="add del mod">
+          <ac:chgData name="Rita Sobral (1201386)" userId="a10e2ee0-50b2-4678-bcd9-890343c2a6f4" providerId="ADAL" clId="{521A3E97-D9B2-46D2-B8AE-2A70BC795E9E}" dt="2022-03-20T14:37:05.814" v="2680" actId="478"/>
+          <ac:cxnSpMkLst>
+            <pc:docMk/>
+            <pc:sldMk cId="2607341909" sldId="258"/>
+            <ac:cxnSpMk id="30" creationId="{5D763B32-A93D-477D-B156-45DC66EDA149}"/>
+          </ac:cxnSpMkLst>
+        </pc:cxnChg>
+        <pc:cxnChg chg="add del mod">
+          <ac:chgData name="Rita Sobral (1201386)" userId="a10e2ee0-50b2-4678-bcd9-890343c2a6f4" providerId="ADAL" clId="{521A3E97-D9B2-46D2-B8AE-2A70BC795E9E}" dt="2022-03-20T14:37:05.814" v="2680" actId="478"/>
+          <ac:cxnSpMkLst>
+            <pc:docMk/>
+            <pc:sldMk cId="2607341909" sldId="258"/>
+            <ac:cxnSpMk id="31" creationId="{D7B9C71A-9921-4A95-B79C-5185E50B3C5E}"/>
+          </ac:cxnSpMkLst>
+        </pc:cxnChg>
+        <pc:cxnChg chg="add del mod">
+          <ac:chgData name="Rita Sobral (1201386)" userId="a10e2ee0-50b2-4678-bcd9-890343c2a6f4" providerId="ADAL" clId="{521A3E97-D9B2-46D2-B8AE-2A70BC795E9E}" dt="2022-03-20T14:37:05.814" v="2680" actId="478"/>
+          <ac:cxnSpMkLst>
+            <pc:docMk/>
+            <pc:sldMk cId="2607341909" sldId="258"/>
+            <ac:cxnSpMk id="32" creationId="{C58E850F-1011-4242-A90B-6314CD3E2585}"/>
+          </ac:cxnSpMkLst>
+        </pc:cxnChg>
+        <pc:cxnChg chg="add del mod">
+          <ac:chgData name="Rita Sobral (1201386)" userId="a10e2ee0-50b2-4678-bcd9-890343c2a6f4" providerId="ADAL" clId="{521A3E97-D9B2-46D2-B8AE-2A70BC795E9E}" dt="2022-03-20T14:37:05.814" v="2680" actId="478"/>
+          <ac:cxnSpMkLst>
+            <pc:docMk/>
+            <pc:sldMk cId="2607341909" sldId="258"/>
+            <ac:cxnSpMk id="33" creationId="{5F0E504D-FA87-4F5E-82C5-9C2F8A0EE8B9}"/>
+          </ac:cxnSpMkLst>
+        </pc:cxnChg>
       </pc:sldChg>
     </pc:docChg>
   </pc:docChgLst>
@@ -3511,7 +3815,7 @@
           <a:p>
             <a:fld id="{8F82C252-1427-4D8D-AB30-AD263CCB5166}" type="datetimeFigureOut">
               <a:rPr lang="pt-PT" smtClean="0"/>
-              <a:t>19/03/2022</a:t>
+              <a:t>20/03/2022</a:t>
             </a:fld>
             <a:endParaRPr lang="pt-PT"/>
           </a:p>
@@ -3709,7 +4013,7 @@
           <a:p>
             <a:fld id="{8F82C252-1427-4D8D-AB30-AD263CCB5166}" type="datetimeFigureOut">
               <a:rPr lang="pt-PT" smtClean="0"/>
-              <a:t>19/03/2022</a:t>
+              <a:t>20/03/2022</a:t>
             </a:fld>
             <a:endParaRPr lang="pt-PT"/>
           </a:p>
@@ -3917,7 +4221,7 @@
           <a:p>
             <a:fld id="{8F82C252-1427-4D8D-AB30-AD263CCB5166}" type="datetimeFigureOut">
               <a:rPr lang="pt-PT" smtClean="0"/>
-              <a:t>19/03/2022</a:t>
+              <a:t>20/03/2022</a:t>
             </a:fld>
             <a:endParaRPr lang="pt-PT"/>
           </a:p>
@@ -4115,7 +4419,7 @@
           <a:p>
             <a:fld id="{8F82C252-1427-4D8D-AB30-AD263CCB5166}" type="datetimeFigureOut">
               <a:rPr lang="pt-PT" smtClean="0"/>
-              <a:t>19/03/2022</a:t>
+              <a:t>20/03/2022</a:t>
             </a:fld>
             <a:endParaRPr lang="pt-PT"/>
           </a:p>
@@ -4390,7 +4694,7 @@
           <a:p>
             <a:fld id="{8F82C252-1427-4D8D-AB30-AD263CCB5166}" type="datetimeFigureOut">
               <a:rPr lang="pt-PT" smtClean="0"/>
-              <a:t>19/03/2022</a:t>
+              <a:t>20/03/2022</a:t>
             </a:fld>
             <a:endParaRPr lang="pt-PT"/>
           </a:p>
@@ -4655,7 +4959,7 @@
           <a:p>
             <a:fld id="{8F82C252-1427-4D8D-AB30-AD263CCB5166}" type="datetimeFigureOut">
               <a:rPr lang="pt-PT" smtClean="0"/>
-              <a:t>19/03/2022</a:t>
+              <a:t>20/03/2022</a:t>
             </a:fld>
             <a:endParaRPr lang="pt-PT"/>
           </a:p>
@@ -5067,7 +5371,7 @@
           <a:p>
             <a:fld id="{8F82C252-1427-4D8D-AB30-AD263CCB5166}" type="datetimeFigureOut">
               <a:rPr lang="pt-PT" smtClean="0"/>
-              <a:t>19/03/2022</a:t>
+              <a:t>20/03/2022</a:t>
             </a:fld>
             <a:endParaRPr lang="pt-PT"/>
           </a:p>
@@ -5208,7 +5512,7 @@
           <a:p>
             <a:fld id="{8F82C252-1427-4D8D-AB30-AD263CCB5166}" type="datetimeFigureOut">
               <a:rPr lang="pt-PT" smtClean="0"/>
-              <a:t>19/03/2022</a:t>
+              <a:t>20/03/2022</a:t>
             </a:fld>
             <a:endParaRPr lang="pt-PT"/>
           </a:p>
@@ -5321,7 +5625,7 @@
           <a:p>
             <a:fld id="{8F82C252-1427-4D8D-AB30-AD263CCB5166}" type="datetimeFigureOut">
               <a:rPr lang="pt-PT" smtClean="0"/>
-              <a:t>19/03/2022</a:t>
+              <a:t>20/03/2022</a:t>
             </a:fld>
             <a:endParaRPr lang="pt-PT"/>
           </a:p>
@@ -5632,7 +5936,7 @@
           <a:p>
             <a:fld id="{8F82C252-1427-4D8D-AB30-AD263CCB5166}" type="datetimeFigureOut">
               <a:rPr lang="pt-PT" smtClean="0"/>
-              <a:t>19/03/2022</a:t>
+              <a:t>20/03/2022</a:t>
             </a:fld>
             <a:endParaRPr lang="pt-PT"/>
           </a:p>
@@ -5920,7 +6224,7 @@
           <a:p>
             <a:fld id="{8F82C252-1427-4D8D-AB30-AD263CCB5166}" type="datetimeFigureOut">
               <a:rPr lang="pt-PT" smtClean="0"/>
-              <a:t>19/03/2022</a:t>
+              <a:t>20/03/2022</a:t>
             </a:fld>
             <a:endParaRPr lang="pt-PT"/>
           </a:p>
@@ -6161,7 +6465,7 @@
           <a:p>
             <a:fld id="{8F82C252-1427-4D8D-AB30-AD263CCB5166}" type="datetimeFigureOut">
               <a:rPr lang="pt-PT" smtClean="0"/>
-              <a:t>19/03/2022</a:t>
+              <a:t>20/03/2022</a:t>
             </a:fld>
             <a:endParaRPr lang="pt-PT"/>
           </a:p>
@@ -16484,6 +16788,212 @@
 </p:sld>
 </file>
 
+<file path=ppt/slides/slide3.xml><?xml version="1.0" encoding="utf-8"?>
+<p:sld xmlns:a="http://schemas.openxmlformats.org/drawingml/2006/main" xmlns:r="http://schemas.openxmlformats.org/officeDocument/2006/relationships" xmlns:p="http://schemas.openxmlformats.org/presentationml/2006/main">
+  <p:cSld>
+    <p:spTree>
+      <p:nvGrpSpPr>
+        <p:cNvPr id="1" name=""/>
+        <p:cNvGrpSpPr/>
+        <p:nvPr/>
+      </p:nvGrpSpPr>
+      <p:grpSpPr>
+        <a:xfrm>
+          <a:off x="0" y="0"/>
+          <a:ext cx="0" cy="0"/>
+          <a:chOff x="0" y="0"/>
+          <a:chExt cx="0" cy="0"/>
+        </a:xfrm>
+      </p:grpSpPr>
+      <p:pic>
+        <p:nvPicPr>
+          <p:cNvPr id="38" name="Imagem 37">
+            <a:extLst>
+              <a:ext uri="{FF2B5EF4-FFF2-40B4-BE49-F238E27FC236}">
+                <a16:creationId xmlns:a16="http://schemas.microsoft.com/office/drawing/2014/main" id="{BEDCDCF9-77FB-48C7-86FA-103768F0C90A}"/>
+              </a:ext>
+            </a:extLst>
+          </p:cNvPr>
+          <p:cNvPicPr>
+            <a:picLocks noChangeAspect="1"/>
+          </p:cNvPicPr>
+          <p:nvPr/>
+        </p:nvPicPr>
+        <p:blipFill>
+          <a:blip r:embed="rId2">
+            <a:extLst>
+              <a:ext uri="{28A0092B-C50C-407E-A947-70E740481C1C}">
+                <a14:useLocalDpi xmlns:a14="http://schemas.microsoft.com/office/drawing/2010/main" val="0"/>
+              </a:ext>
+            </a:extLst>
+          </a:blip>
+          <a:stretch>
+            <a:fillRect/>
+          </a:stretch>
+        </p:blipFill>
+        <p:spPr>
+          <a:xfrm>
+            <a:off x="1092200" y="1463094"/>
+            <a:ext cx="10007600" cy="2476500"/>
+          </a:xfrm>
+          <a:prstGeom prst="rect">
+            <a:avLst/>
+          </a:prstGeom>
+        </p:spPr>
+      </p:pic>
+      <p:sp>
+        <p:nvSpPr>
+          <p:cNvPr id="39" name="Retângulo 38">
+            <a:extLst>
+              <a:ext uri="{FF2B5EF4-FFF2-40B4-BE49-F238E27FC236}">
+                <a16:creationId xmlns:a16="http://schemas.microsoft.com/office/drawing/2014/main" id="{CB3C094D-7E68-47B8-BC7B-D18095478485}"/>
+              </a:ext>
+            </a:extLst>
+          </p:cNvPr>
+          <p:cNvSpPr/>
+          <p:nvPr/>
+        </p:nvSpPr>
+        <p:spPr>
+          <a:xfrm>
+            <a:off x="1159099" y="3939594"/>
+            <a:ext cx="9845898" cy="2042643"/>
+          </a:xfrm>
+          <a:prstGeom prst="rect">
+            <a:avLst/>
+          </a:prstGeom>
+          <a:noFill/>
+          <a:ln w="38100">
+            <a:solidFill>
+              <a:schemeClr val="tx1"/>
+            </a:solidFill>
+          </a:ln>
+        </p:spPr>
+        <p:style>
+          <a:lnRef idx="2">
+            <a:schemeClr val="accent1">
+              <a:shade val="50000"/>
+            </a:schemeClr>
+          </a:lnRef>
+          <a:fillRef idx="1">
+            <a:schemeClr val="accent1"/>
+          </a:fillRef>
+          <a:effectRef idx="0">
+            <a:schemeClr val="accent1"/>
+          </a:effectRef>
+          <a:fontRef idx="minor">
+            <a:schemeClr val="lt1"/>
+          </a:fontRef>
+        </p:style>
+        <p:txBody>
+          <a:bodyPr rtlCol="0" anchor="ctr"/>
+          <a:lstStyle/>
+          <a:p>
+            <a:pPr algn="ctr"/>
+            <a:endParaRPr lang="pt-PT"/>
+          </a:p>
+        </p:txBody>
+      </p:sp>
+      <p:sp>
+        <p:nvSpPr>
+          <p:cNvPr id="40" name="Retângulo 39">
+            <a:extLst>
+              <a:ext uri="{FF2B5EF4-FFF2-40B4-BE49-F238E27FC236}">
+                <a16:creationId xmlns:a16="http://schemas.microsoft.com/office/drawing/2014/main" id="{DA4410FD-9C80-4D37-9F7C-676DE426D603}"/>
+              </a:ext>
+            </a:extLst>
+          </p:cNvPr>
+          <p:cNvSpPr/>
+          <p:nvPr/>
+        </p:nvSpPr>
+        <p:spPr>
+          <a:xfrm>
+            <a:off x="1235299" y="4015795"/>
+            <a:ext cx="9698864" cy="1902048"/>
+          </a:xfrm>
+          <a:prstGeom prst="rect">
+            <a:avLst/>
+          </a:prstGeom>
+          <a:noFill/>
+          <a:ln w="38100">
+            <a:solidFill>
+              <a:schemeClr val="tx1"/>
+            </a:solidFill>
+          </a:ln>
+        </p:spPr>
+        <p:style>
+          <a:lnRef idx="2">
+            <a:schemeClr val="accent1">
+              <a:shade val="50000"/>
+            </a:schemeClr>
+          </a:lnRef>
+          <a:fillRef idx="1">
+            <a:schemeClr val="accent1"/>
+          </a:fillRef>
+          <a:effectRef idx="0">
+            <a:schemeClr val="accent1"/>
+          </a:effectRef>
+          <a:fontRef idx="minor">
+            <a:schemeClr val="lt1"/>
+          </a:fontRef>
+        </p:style>
+        <p:txBody>
+          <a:bodyPr rtlCol="0" anchor="ctr"/>
+          <a:lstStyle/>
+          <a:p>
+            <a:pPr algn="ctr"/>
+            <a:endParaRPr lang="pt-PT"/>
+          </a:p>
+        </p:txBody>
+      </p:sp>
+      <p:pic>
+        <p:nvPicPr>
+          <p:cNvPr id="42" name="Imagem 41" descr="Uma imagem com texto&#10;&#10;Descrição gerada automaticamente">
+            <a:extLst>
+              <a:ext uri="{FF2B5EF4-FFF2-40B4-BE49-F238E27FC236}">
+                <a16:creationId xmlns:a16="http://schemas.microsoft.com/office/drawing/2014/main" id="{19DA4B49-6B45-4114-AEAB-2DE2EB403F17}"/>
+              </a:ext>
+            </a:extLst>
+          </p:cNvPr>
+          <p:cNvPicPr>
+            <a:picLocks noChangeAspect="1"/>
+          </p:cNvPicPr>
+          <p:nvPr/>
+        </p:nvPicPr>
+        <p:blipFill>
+          <a:blip r:embed="rId3">
+            <a:extLst>
+              <a:ext uri="{28A0092B-C50C-407E-A947-70E740481C1C}">
+                <a14:useLocalDpi xmlns:a14="http://schemas.microsoft.com/office/drawing/2010/main" val="0"/>
+              </a:ext>
+            </a:extLst>
+          </a:blip>
+          <a:stretch>
+            <a:fillRect/>
+          </a:stretch>
+        </p:blipFill>
+        <p:spPr>
+          <a:xfrm>
+            <a:off x="4231067" y="4184963"/>
+            <a:ext cx="3729865" cy="1398699"/>
+          </a:xfrm>
+          <a:prstGeom prst="rect">
+            <a:avLst/>
+          </a:prstGeom>
+        </p:spPr>
+      </p:pic>
+    </p:spTree>
+    <p:extLst>
+      <p:ext uri="{BB962C8B-B14F-4D97-AF65-F5344CB8AC3E}">
+        <p14:creationId xmlns:p14="http://schemas.microsoft.com/office/powerpoint/2010/main" val="2607341909"/>
+      </p:ext>
+    </p:extLst>
+  </p:cSld>
+  <p:clrMapOvr>
+    <a:masterClrMapping/>
+  </p:clrMapOvr>
+</p:sld>
+</file>
+
 <file path=ppt/theme/theme1.xml><?xml version="1.0" encoding="utf-8"?>
 <a:theme xmlns:a="http://schemas.openxmlformats.org/drawingml/2006/main" name="Tema do Office">
   <a:themeElements>

</xml_diff>

<commit_message>
Atualização de uma imagem
</commit_message>
<xml_diff>
--- a/doc/sprint1/1201386/Cabeamento estruturado.pptx
+++ b/doc/sprint1/1201386/Cabeamento estruturado.pptx
@@ -117,7 +117,7 @@
 <file path=ppt/revisionInfo.xml><?xml version="1.0" encoding="utf-8"?>
 <p1510:revInfo xmlns:a="http://schemas.openxmlformats.org/drawingml/2006/main" xmlns:r="http://schemas.openxmlformats.org/officeDocument/2006/relationships" xmlns:p1510="http://schemas.microsoft.com/office/powerpoint/2015/10/main">
   <p1510:revLst>
-    <p1510:client id="{521A3E97-D9B2-46D2-B8AE-2A70BC795E9E}" v="463" dt="2022-03-20T14:38:40.495"/>
+    <p1510:client id="{521A3E97-D9B2-46D2-B8AE-2A70BC795E9E}" v="474" dt="2022-03-20T16:04:26.458"/>
   </p1510:revLst>
 </p1510:revInfo>
 </file>
@@ -127,7 +127,7 @@
   <pc:docChgLst>
     <pc:chgData name="Rita Sobral (1201386)" userId="a10e2ee0-50b2-4678-bcd9-890343c2a6f4" providerId="ADAL" clId="{521A3E97-D9B2-46D2-B8AE-2A70BC795E9E}"/>
     <pc:docChg chg="undo redo custSel addSld delSld modSld">
-      <pc:chgData name="Rita Sobral (1201386)" userId="a10e2ee0-50b2-4678-bcd9-890343c2a6f4" providerId="ADAL" clId="{521A3E97-D9B2-46D2-B8AE-2A70BC795E9E}" dt="2022-03-20T14:38:58.910" v="2705" actId="1076"/>
+      <pc:chgData name="Rita Sobral (1201386)" userId="a10e2ee0-50b2-4678-bcd9-890343c2a6f4" providerId="ADAL" clId="{521A3E97-D9B2-46D2-B8AE-2A70BC795E9E}" dt="2022-03-20T16:04:39.111" v="2816" actId="478"/>
       <pc:docMkLst>
         <pc:docMk/>
       </pc:docMkLst>
@@ -1715,7 +1715,7 @@
         </pc:cxnChg>
       </pc:sldChg>
       <pc:sldChg chg="addSp delSp modSp mod">
-        <pc:chgData name="Rita Sobral (1201386)" userId="a10e2ee0-50b2-4678-bcd9-890343c2a6f4" providerId="ADAL" clId="{521A3E97-D9B2-46D2-B8AE-2A70BC795E9E}" dt="2022-03-19T02:10:59.103" v="2196" actId="1076"/>
+        <pc:chgData name="Rita Sobral (1201386)" userId="a10e2ee0-50b2-4678-bcd9-890343c2a6f4" providerId="ADAL" clId="{521A3E97-D9B2-46D2-B8AE-2A70BC795E9E}" dt="2022-03-20T16:00:57.683" v="2708" actId="1076"/>
         <pc:sldMkLst>
           <pc:docMk/>
           <pc:sldMk cId="1211775621" sldId="257"/>
@@ -2665,7 +2665,7 @@
           </ac:cxnSpMkLst>
         </pc:cxnChg>
         <pc:cxnChg chg="add mod">
-          <ac:chgData name="Rita Sobral (1201386)" userId="a10e2ee0-50b2-4678-bcd9-890343c2a6f4" providerId="ADAL" clId="{521A3E97-D9B2-46D2-B8AE-2A70BC795E9E}" dt="2022-03-14T15:57:52.486" v="823" actId="1582"/>
+          <ac:chgData name="Rita Sobral (1201386)" userId="a10e2ee0-50b2-4678-bcd9-890343c2a6f4" providerId="ADAL" clId="{521A3E97-D9B2-46D2-B8AE-2A70BC795E9E}" dt="2022-03-20T16:00:57.683" v="2708" actId="1076"/>
           <ac:cxnSpMkLst>
             <pc:docMk/>
             <pc:sldMk cId="1211775621" sldId="257"/>
@@ -3361,11 +3361,19 @@
         </pc:picChg>
       </pc:sldChg>
       <pc:sldChg chg="addSp delSp modSp new mod">
-        <pc:chgData name="Rita Sobral (1201386)" userId="a10e2ee0-50b2-4678-bcd9-890343c2a6f4" providerId="ADAL" clId="{521A3E97-D9B2-46D2-B8AE-2A70BC795E9E}" dt="2022-03-20T14:38:58.910" v="2705" actId="1076"/>
+        <pc:chgData name="Rita Sobral (1201386)" userId="a10e2ee0-50b2-4678-bcd9-890343c2a6f4" providerId="ADAL" clId="{521A3E97-D9B2-46D2-B8AE-2A70BC795E9E}" dt="2022-03-20T16:04:39.111" v="2816" actId="478"/>
         <pc:sldMkLst>
           <pc:docMk/>
           <pc:sldMk cId="2607341909" sldId="258"/>
         </pc:sldMkLst>
+        <pc:spChg chg="add mod">
+          <ac:chgData name="Rita Sobral (1201386)" userId="a10e2ee0-50b2-4678-bcd9-890343c2a6f4" providerId="ADAL" clId="{521A3E97-D9B2-46D2-B8AE-2A70BC795E9E}" dt="2022-03-20T16:03:23.055" v="2758" actId="20577"/>
+          <ac:spMkLst>
+            <pc:docMk/>
+            <pc:sldMk cId="2607341909" sldId="258"/>
+            <ac:spMk id="3" creationId="{93ACD1F9-46C1-4CF5-9377-8A59D0853E0C}"/>
+          </ac:spMkLst>
+        </pc:spChg>
         <pc:spChg chg="add del mod">
           <ac:chgData name="Rita Sobral (1201386)" userId="a10e2ee0-50b2-4678-bcd9-890343c2a6f4" providerId="ADAL" clId="{521A3E97-D9B2-46D2-B8AE-2A70BC795E9E}" dt="2022-03-20T14:12:42.902" v="2247" actId="478"/>
           <ac:spMkLst>
@@ -3382,12 +3390,36 @@
             <ac:spMk id="12" creationId="{4FA6CA71-E380-4361-AEEC-D288441312D0}"/>
           </ac:spMkLst>
         </pc:spChg>
+        <pc:spChg chg="add mod">
+          <ac:chgData name="Rita Sobral (1201386)" userId="a10e2ee0-50b2-4678-bcd9-890343c2a6f4" providerId="ADAL" clId="{521A3E97-D9B2-46D2-B8AE-2A70BC795E9E}" dt="2022-03-20T16:03:43.321" v="2773" actId="20577"/>
+          <ac:spMkLst>
+            <pc:docMk/>
+            <pc:sldMk cId="2607341909" sldId="258"/>
+            <ac:spMk id="13" creationId="{7CBFD817-A389-474B-8690-8C0795FB3E86}"/>
+          </ac:spMkLst>
+        </pc:spChg>
         <pc:spChg chg="add del mod">
           <ac:chgData name="Rita Sobral (1201386)" userId="a10e2ee0-50b2-4678-bcd9-890343c2a6f4" providerId="ADAL" clId="{521A3E97-D9B2-46D2-B8AE-2A70BC795E9E}" dt="2022-03-20T14:37:05.814" v="2680" actId="478"/>
           <ac:spMkLst>
             <pc:docMk/>
             <pc:sldMk cId="2607341909" sldId="258"/>
             <ac:spMk id="14" creationId="{0D0F3FE2-F942-4D55-9991-95BF189703E7}"/>
+          </ac:spMkLst>
+        </pc:spChg>
+        <pc:spChg chg="add mod">
+          <ac:chgData name="Rita Sobral (1201386)" userId="a10e2ee0-50b2-4678-bcd9-890343c2a6f4" providerId="ADAL" clId="{521A3E97-D9B2-46D2-B8AE-2A70BC795E9E}" dt="2022-03-20T16:03:58.657" v="2788" actId="20577"/>
+          <ac:spMkLst>
+            <pc:docMk/>
+            <pc:sldMk cId="2607341909" sldId="258"/>
+            <ac:spMk id="14" creationId="{9B4B218A-1F90-4F74-A9B4-CD59F052E6F6}"/>
+          </ac:spMkLst>
+        </pc:spChg>
+        <pc:spChg chg="add mod">
+          <ac:chgData name="Rita Sobral (1201386)" userId="a10e2ee0-50b2-4678-bcd9-890343c2a6f4" providerId="ADAL" clId="{521A3E97-D9B2-46D2-B8AE-2A70BC795E9E}" dt="2022-03-20T16:04:21.891" v="2805" actId="5793"/>
+          <ac:spMkLst>
+            <pc:docMk/>
+            <pc:sldMk cId="2607341909" sldId="258"/>
+            <ac:spMk id="15" creationId="{B26A65B8-EF25-467B-84D1-162467B6915E}"/>
           </ac:spMkLst>
         </pc:spChg>
         <pc:spChg chg="add del mod">
@@ -3396,6 +3428,14 @@
             <pc:docMk/>
             <pc:sldMk cId="2607341909" sldId="258"/>
             <ac:spMk id="16" creationId="{639ECB3C-B68C-4F4A-BB49-9278E90A2253}"/>
+          </ac:spMkLst>
+        </pc:spChg>
+        <pc:spChg chg="add mod">
+          <ac:chgData name="Rita Sobral (1201386)" userId="a10e2ee0-50b2-4678-bcd9-890343c2a6f4" providerId="ADAL" clId="{521A3E97-D9B2-46D2-B8AE-2A70BC795E9E}" dt="2022-03-20T16:04:35.951" v="2815" actId="20577"/>
+          <ac:spMkLst>
+            <pc:docMk/>
+            <pc:sldMk cId="2607341909" sldId="258"/>
+            <ac:spMk id="16" creationId="{DA660FDC-8CB4-4CEF-8E2B-5121042C3A45}"/>
           </ac:spMkLst>
         </pc:spChg>
         <pc:spChg chg="add del mod">
@@ -3614,14 +3654,54 @@
             <ac:picMk id="38" creationId="{BEDCDCF9-77FB-48C7-86FA-103768F0C90A}"/>
           </ac:picMkLst>
         </pc:picChg>
-        <pc:picChg chg="add mod">
-          <ac:chgData name="Rita Sobral (1201386)" userId="a10e2ee0-50b2-4678-bcd9-890343c2a6f4" providerId="ADAL" clId="{521A3E97-D9B2-46D2-B8AE-2A70BC795E9E}" dt="2022-03-20T14:38:58.910" v="2705" actId="1076"/>
+        <pc:picChg chg="add del mod">
+          <ac:chgData name="Rita Sobral (1201386)" userId="a10e2ee0-50b2-4678-bcd9-890343c2a6f4" providerId="ADAL" clId="{521A3E97-D9B2-46D2-B8AE-2A70BC795E9E}" dt="2022-03-20T16:04:39.111" v="2816" actId="478"/>
           <ac:picMkLst>
             <pc:docMk/>
             <pc:sldMk cId="2607341909" sldId="258"/>
             <ac:picMk id="42" creationId="{19DA4B49-6B45-4114-AEAB-2DE2EB403F17}"/>
           </ac:picMkLst>
         </pc:picChg>
+        <pc:cxnChg chg="add mod">
+          <ac:chgData name="Rita Sobral (1201386)" userId="a10e2ee0-50b2-4678-bcd9-890343c2a6f4" providerId="ADAL" clId="{521A3E97-D9B2-46D2-B8AE-2A70BC795E9E}" dt="2022-03-20T16:01:09.927" v="2711" actId="1076"/>
+          <ac:cxnSpMkLst>
+            <pc:docMk/>
+            <pc:sldMk cId="2607341909" sldId="258"/>
+            <ac:cxnSpMk id="6" creationId="{70A06A0B-2986-48C1-9A6A-2F597A2A750C}"/>
+          </ac:cxnSpMkLst>
+        </pc:cxnChg>
+        <pc:cxnChg chg="add mod">
+          <ac:chgData name="Rita Sobral (1201386)" userId="a10e2ee0-50b2-4678-bcd9-890343c2a6f4" providerId="ADAL" clId="{521A3E97-D9B2-46D2-B8AE-2A70BC795E9E}" dt="2022-03-20T16:02:15.152" v="2724" actId="693"/>
+          <ac:cxnSpMkLst>
+            <pc:docMk/>
+            <pc:sldMk cId="2607341909" sldId="258"/>
+            <ac:cxnSpMk id="8" creationId="{DEA30116-05D4-4D33-8534-0A4BBE7CB2AF}"/>
+          </ac:cxnSpMkLst>
+        </pc:cxnChg>
+        <pc:cxnChg chg="add mod">
+          <ac:chgData name="Rita Sobral (1201386)" userId="a10e2ee0-50b2-4678-bcd9-890343c2a6f4" providerId="ADAL" clId="{521A3E97-D9B2-46D2-B8AE-2A70BC795E9E}" dt="2022-03-20T16:02:33.742" v="2727" actId="208"/>
+          <ac:cxnSpMkLst>
+            <pc:docMk/>
+            <pc:sldMk cId="2607341909" sldId="258"/>
+            <ac:cxnSpMk id="9" creationId="{BB68818A-B47C-44E0-BBF4-D79DCC940EBF}"/>
+          </ac:cxnSpMkLst>
+        </pc:cxnChg>
+        <pc:cxnChg chg="add mod">
+          <ac:chgData name="Rita Sobral (1201386)" userId="a10e2ee0-50b2-4678-bcd9-890343c2a6f4" providerId="ADAL" clId="{521A3E97-D9B2-46D2-B8AE-2A70BC795E9E}" dt="2022-03-20T16:02:37.746" v="2728" actId="208"/>
+          <ac:cxnSpMkLst>
+            <pc:docMk/>
+            <pc:sldMk cId="2607341909" sldId="258"/>
+            <ac:cxnSpMk id="10" creationId="{29E25947-45D6-447A-90F2-C98230DEF8BD}"/>
+          </ac:cxnSpMkLst>
+        </pc:cxnChg>
+        <pc:cxnChg chg="add mod">
+          <ac:chgData name="Rita Sobral (1201386)" userId="a10e2ee0-50b2-4678-bcd9-890343c2a6f4" providerId="ADAL" clId="{521A3E97-D9B2-46D2-B8AE-2A70BC795E9E}" dt="2022-03-20T16:02:42.548" v="2729" actId="208"/>
+          <ac:cxnSpMkLst>
+            <pc:docMk/>
+            <pc:sldMk cId="2607341909" sldId="258"/>
+            <ac:cxnSpMk id="11" creationId="{D8E03237-192F-4A4A-8725-9F21BD283BE1}"/>
+          </ac:cxnSpMkLst>
+        </pc:cxnChg>
         <pc:cxnChg chg="add del mod">
           <ac:chgData name="Rita Sobral (1201386)" userId="a10e2ee0-50b2-4678-bcd9-890343c2a6f4" providerId="ADAL" clId="{521A3E97-D9B2-46D2-B8AE-2A70BC795E9E}" dt="2022-03-20T14:37:05.814" v="2680" actId="478"/>
           <ac:cxnSpMkLst>
@@ -16945,42 +17025,392 @@
           </a:p>
         </p:txBody>
       </p:sp>
-      <p:pic>
-        <p:nvPicPr>
-          <p:cNvPr id="42" name="Imagem 41" descr="Uma imagem com texto&#10;&#10;Descrição gerada automaticamente">
-            <a:extLst>
-              <a:ext uri="{FF2B5EF4-FFF2-40B4-BE49-F238E27FC236}">
-                <a16:creationId xmlns:a16="http://schemas.microsoft.com/office/drawing/2014/main" id="{19DA4B49-6B45-4114-AEAB-2DE2EB403F17}"/>
-              </a:ext>
-            </a:extLst>
-          </p:cNvPr>
-          <p:cNvPicPr>
-            <a:picLocks noChangeAspect="1"/>
-          </p:cNvPicPr>
-          <p:nvPr/>
-        </p:nvPicPr>
-        <p:blipFill>
-          <a:blip r:embed="rId3">
-            <a:extLst>
-              <a:ext uri="{28A0092B-C50C-407E-A947-70E740481C1C}">
-                <a14:useLocalDpi xmlns:a14="http://schemas.microsoft.com/office/drawing/2010/main" val="0"/>
-              </a:ext>
-            </a:extLst>
-          </a:blip>
-          <a:stretch>
-            <a:fillRect/>
-          </a:stretch>
-        </p:blipFill>
-        <p:spPr>
-          <a:xfrm>
-            <a:off x="4231067" y="4184963"/>
-            <a:ext cx="3729865" cy="1398699"/>
+      <p:cxnSp>
+        <p:nvCxnSpPr>
+          <p:cNvPr id="6" name="Conexão reta 5">
+            <a:extLst>
+              <a:ext uri="{FF2B5EF4-FFF2-40B4-BE49-F238E27FC236}">
+                <a16:creationId xmlns:a16="http://schemas.microsoft.com/office/drawing/2014/main" id="{70A06A0B-2986-48C1-9A6A-2F597A2A750C}"/>
+              </a:ext>
+            </a:extLst>
+          </p:cNvPr>
+          <p:cNvCxnSpPr>
+            <a:cxnSpLocks/>
+          </p:cNvCxnSpPr>
+          <p:nvPr/>
+        </p:nvCxnSpPr>
+        <p:spPr>
+          <a:xfrm flipH="1">
+            <a:off x="3125164" y="4324683"/>
+            <a:ext cx="964630" cy="0"/>
+          </a:xfrm>
+          <a:prstGeom prst="line">
+            <a:avLst/>
+          </a:prstGeom>
+          <a:ln w="38100"/>
+        </p:spPr>
+        <p:style>
+          <a:lnRef idx="3">
+            <a:schemeClr val="accent2"/>
+          </a:lnRef>
+          <a:fillRef idx="0">
+            <a:schemeClr val="accent2"/>
+          </a:fillRef>
+          <a:effectRef idx="2">
+            <a:schemeClr val="accent2"/>
+          </a:effectRef>
+          <a:fontRef idx="minor">
+            <a:schemeClr val="tx1"/>
+          </a:fontRef>
+        </p:style>
+      </p:cxnSp>
+      <p:cxnSp>
+        <p:nvCxnSpPr>
+          <p:cNvPr id="8" name="Conexão reta 7">
+            <a:extLst>
+              <a:ext uri="{FF2B5EF4-FFF2-40B4-BE49-F238E27FC236}">
+                <a16:creationId xmlns:a16="http://schemas.microsoft.com/office/drawing/2014/main" id="{DEA30116-05D4-4D33-8534-0A4BBE7CB2AF}"/>
+              </a:ext>
+            </a:extLst>
+          </p:cNvPr>
+          <p:cNvCxnSpPr>
+            <a:cxnSpLocks/>
+          </p:cNvCxnSpPr>
+          <p:nvPr/>
+        </p:nvCxnSpPr>
+        <p:spPr>
+          <a:xfrm flipH="1">
+            <a:off x="3125164" y="4598617"/>
+            <a:ext cx="964630" cy="0"/>
+          </a:xfrm>
+          <a:prstGeom prst="line">
+            <a:avLst/>
+          </a:prstGeom>
+          <a:ln w="38100">
+            <a:prstDash val="sysDash"/>
+          </a:ln>
+        </p:spPr>
+        <p:style>
+          <a:lnRef idx="3">
+            <a:schemeClr val="accent2"/>
+          </a:lnRef>
+          <a:fillRef idx="0">
+            <a:schemeClr val="accent2"/>
+          </a:fillRef>
+          <a:effectRef idx="2">
+            <a:schemeClr val="accent2"/>
+          </a:effectRef>
+          <a:fontRef idx="minor">
+            <a:schemeClr val="tx1"/>
+          </a:fontRef>
+        </p:style>
+      </p:cxnSp>
+      <p:cxnSp>
+        <p:nvCxnSpPr>
+          <p:cNvPr id="9" name="Conexão reta 8">
+            <a:extLst>
+              <a:ext uri="{FF2B5EF4-FFF2-40B4-BE49-F238E27FC236}">
+                <a16:creationId xmlns:a16="http://schemas.microsoft.com/office/drawing/2014/main" id="{BB68818A-B47C-44E0-BBF4-D79DCC940EBF}"/>
+              </a:ext>
+            </a:extLst>
+          </p:cNvPr>
+          <p:cNvCxnSpPr>
+            <a:cxnSpLocks/>
+          </p:cNvCxnSpPr>
+          <p:nvPr/>
+        </p:nvCxnSpPr>
+        <p:spPr>
+          <a:xfrm flipH="1">
+            <a:off x="3125164" y="4901489"/>
+            <a:ext cx="964630" cy="0"/>
+          </a:xfrm>
+          <a:prstGeom prst="line">
+            <a:avLst/>
+          </a:prstGeom>
+          <a:ln w="38100">
+            <a:solidFill>
+              <a:srgbClr val="7030A0"/>
+            </a:solidFill>
+          </a:ln>
+        </p:spPr>
+        <p:style>
+          <a:lnRef idx="3">
+            <a:schemeClr val="accent2"/>
+          </a:lnRef>
+          <a:fillRef idx="0">
+            <a:schemeClr val="accent2"/>
+          </a:fillRef>
+          <a:effectRef idx="2">
+            <a:schemeClr val="accent2"/>
+          </a:effectRef>
+          <a:fontRef idx="minor">
+            <a:schemeClr val="tx1"/>
+          </a:fontRef>
+        </p:style>
+      </p:cxnSp>
+      <p:cxnSp>
+        <p:nvCxnSpPr>
+          <p:cNvPr id="10" name="Conexão reta 9">
+            <a:extLst>
+              <a:ext uri="{FF2B5EF4-FFF2-40B4-BE49-F238E27FC236}">
+                <a16:creationId xmlns:a16="http://schemas.microsoft.com/office/drawing/2014/main" id="{29E25947-45D6-447A-90F2-C98230DEF8BD}"/>
+              </a:ext>
+            </a:extLst>
+          </p:cNvPr>
+          <p:cNvCxnSpPr>
+            <a:cxnSpLocks/>
+          </p:cNvCxnSpPr>
+          <p:nvPr/>
+        </p:nvCxnSpPr>
+        <p:spPr>
+          <a:xfrm flipH="1">
+            <a:off x="3125164" y="5198572"/>
+            <a:ext cx="964630" cy="0"/>
+          </a:xfrm>
+          <a:prstGeom prst="line">
+            <a:avLst/>
+          </a:prstGeom>
+          <a:ln w="38100">
+            <a:solidFill>
+              <a:srgbClr val="7030A0"/>
+            </a:solidFill>
+            <a:prstDash val="sysDash"/>
+          </a:ln>
+        </p:spPr>
+        <p:style>
+          <a:lnRef idx="3">
+            <a:schemeClr val="accent2"/>
+          </a:lnRef>
+          <a:fillRef idx="0">
+            <a:schemeClr val="accent2"/>
+          </a:fillRef>
+          <a:effectRef idx="2">
+            <a:schemeClr val="accent2"/>
+          </a:effectRef>
+          <a:fontRef idx="minor">
+            <a:schemeClr val="tx1"/>
+          </a:fontRef>
+        </p:style>
+      </p:cxnSp>
+      <p:cxnSp>
+        <p:nvCxnSpPr>
+          <p:cNvPr id="11" name="Conexão reta 10">
+            <a:extLst>
+              <a:ext uri="{FF2B5EF4-FFF2-40B4-BE49-F238E27FC236}">
+                <a16:creationId xmlns:a16="http://schemas.microsoft.com/office/drawing/2014/main" id="{D8E03237-192F-4A4A-8725-9F21BD283BE1}"/>
+              </a:ext>
+            </a:extLst>
+          </p:cNvPr>
+          <p:cNvCxnSpPr>
+            <a:cxnSpLocks/>
+          </p:cNvCxnSpPr>
+          <p:nvPr/>
+        </p:nvCxnSpPr>
+        <p:spPr>
+          <a:xfrm flipH="1">
+            <a:off x="3125164" y="5489869"/>
+            <a:ext cx="964630" cy="0"/>
+          </a:xfrm>
+          <a:prstGeom prst="line">
+            <a:avLst/>
+          </a:prstGeom>
+          <a:ln w="38100">
+            <a:solidFill>
+              <a:srgbClr val="FF25E0"/>
+            </a:solidFill>
+            <a:prstDash val="sysDash"/>
+          </a:ln>
+        </p:spPr>
+        <p:style>
+          <a:lnRef idx="3">
+            <a:schemeClr val="accent2"/>
+          </a:lnRef>
+          <a:fillRef idx="0">
+            <a:schemeClr val="accent2"/>
+          </a:fillRef>
+          <a:effectRef idx="2">
+            <a:schemeClr val="accent2"/>
+          </a:effectRef>
+          <a:fontRef idx="minor">
+            <a:schemeClr val="tx1"/>
+          </a:fontRef>
+        </p:style>
+      </p:cxnSp>
+      <p:sp>
+        <p:nvSpPr>
+          <p:cNvPr id="3" name="CaixaDeTexto 2">
+            <a:extLst>
+              <a:ext uri="{FF2B5EF4-FFF2-40B4-BE49-F238E27FC236}">
+                <a16:creationId xmlns:a16="http://schemas.microsoft.com/office/drawing/2014/main" id="{93ACD1F9-46C1-4CF5-9377-8A59D0853E0C}"/>
+              </a:ext>
+            </a:extLst>
+          </p:cNvPr>
+          <p:cNvSpPr txBox="1"/>
+          <p:nvPr/>
+        </p:nvSpPr>
+        <p:spPr>
+          <a:xfrm>
+            <a:off x="4165994" y="4209413"/>
+            <a:ext cx="2019783" cy="246221"/>
           </a:xfrm>
           <a:prstGeom prst="rect">
             <a:avLst/>
           </a:prstGeom>
-        </p:spPr>
-      </p:pic>
+          <a:noFill/>
+        </p:spPr>
+        <p:txBody>
+          <a:bodyPr wrap="square" rtlCol="0">
+            <a:spAutoFit/>
+          </a:bodyPr>
+          <a:lstStyle/>
+          <a:p>
+            <a:r>
+              <a:rPr lang="pt-PT" sz="1000" dirty="0"/>
+              <a:t>CAT 7 copper cable</a:t>
+            </a:r>
+          </a:p>
+        </p:txBody>
+      </p:sp>
+      <p:sp>
+        <p:nvSpPr>
+          <p:cNvPr id="13" name="CaixaDeTexto 12">
+            <a:extLst>
+              <a:ext uri="{FF2B5EF4-FFF2-40B4-BE49-F238E27FC236}">
+                <a16:creationId xmlns:a16="http://schemas.microsoft.com/office/drawing/2014/main" id="{7CBFD817-A389-474B-8690-8C0795FB3E86}"/>
+              </a:ext>
+            </a:extLst>
+          </p:cNvPr>
+          <p:cNvSpPr txBox="1"/>
+          <p:nvPr/>
+        </p:nvSpPr>
+        <p:spPr>
+          <a:xfrm>
+            <a:off x="4165993" y="4460427"/>
+            <a:ext cx="2019783" cy="246221"/>
+          </a:xfrm>
+          <a:prstGeom prst="rect">
+            <a:avLst/>
+          </a:prstGeom>
+          <a:noFill/>
+        </p:spPr>
+        <p:txBody>
+          <a:bodyPr wrap="square" rtlCol="0">
+            <a:spAutoFit/>
+          </a:bodyPr>
+          <a:lstStyle/>
+          <a:p>
+            <a:r>
+              <a:rPr lang="pt-PT" sz="1000" dirty="0"/>
+              <a:t>CAT 7 copper cable - underfloor</a:t>
+            </a:r>
+          </a:p>
+        </p:txBody>
+      </p:sp>
+      <p:sp>
+        <p:nvSpPr>
+          <p:cNvPr id="14" name="CaixaDeTexto 13">
+            <a:extLst>
+              <a:ext uri="{FF2B5EF4-FFF2-40B4-BE49-F238E27FC236}">
+                <a16:creationId xmlns:a16="http://schemas.microsoft.com/office/drawing/2014/main" id="{9B4B218A-1F90-4F74-A9B4-CD59F052E6F6}"/>
+              </a:ext>
+            </a:extLst>
+          </p:cNvPr>
+          <p:cNvSpPr txBox="1"/>
+          <p:nvPr/>
+        </p:nvSpPr>
+        <p:spPr>
+          <a:xfrm>
+            <a:off x="4165993" y="4731987"/>
+            <a:ext cx="2019783" cy="246221"/>
+          </a:xfrm>
+          <a:prstGeom prst="rect">
+            <a:avLst/>
+          </a:prstGeom>
+          <a:noFill/>
+        </p:spPr>
+        <p:txBody>
+          <a:bodyPr wrap="square" rtlCol="0">
+            <a:spAutoFit/>
+          </a:bodyPr>
+          <a:lstStyle/>
+          <a:p>
+            <a:r>
+              <a:rPr lang="pt-PT" sz="1000" dirty="0"/>
+              <a:t>Optical Fibre</a:t>
+            </a:r>
+          </a:p>
+        </p:txBody>
+      </p:sp>
+      <p:sp>
+        <p:nvSpPr>
+          <p:cNvPr id="15" name="CaixaDeTexto 14">
+            <a:extLst>
+              <a:ext uri="{FF2B5EF4-FFF2-40B4-BE49-F238E27FC236}">
+                <a16:creationId xmlns:a16="http://schemas.microsoft.com/office/drawing/2014/main" id="{B26A65B8-EF25-467B-84D1-162467B6915E}"/>
+              </a:ext>
+            </a:extLst>
+          </p:cNvPr>
+          <p:cNvSpPr txBox="1"/>
+          <p:nvPr/>
+        </p:nvSpPr>
+        <p:spPr>
+          <a:xfrm>
+            <a:off x="4165993" y="5054733"/>
+            <a:ext cx="2019783" cy="246221"/>
+          </a:xfrm>
+          <a:prstGeom prst="rect">
+            <a:avLst/>
+          </a:prstGeom>
+          <a:noFill/>
+        </p:spPr>
+        <p:txBody>
+          <a:bodyPr wrap="square" rtlCol="0">
+            <a:spAutoFit/>
+          </a:bodyPr>
+          <a:lstStyle/>
+          <a:p>
+            <a:r>
+              <a:rPr lang="pt-PT" sz="1000" dirty="0"/>
+              <a:t>Optical Fibre – underfloor </a:t>
+            </a:r>
+          </a:p>
+        </p:txBody>
+      </p:sp>
+      <p:sp>
+        <p:nvSpPr>
+          <p:cNvPr id="16" name="CaixaDeTexto 15">
+            <a:extLst>
+              <a:ext uri="{FF2B5EF4-FFF2-40B4-BE49-F238E27FC236}">
+                <a16:creationId xmlns:a16="http://schemas.microsoft.com/office/drawing/2014/main" id="{DA660FDC-8CB4-4CEF-8E2B-5121042C3A45}"/>
+              </a:ext>
+            </a:extLst>
+          </p:cNvPr>
+          <p:cNvSpPr txBox="1"/>
+          <p:nvPr/>
+        </p:nvSpPr>
+        <p:spPr>
+          <a:xfrm>
+            <a:off x="4165993" y="5366758"/>
+            <a:ext cx="2019783" cy="246221"/>
+          </a:xfrm>
+          <a:prstGeom prst="rect">
+            <a:avLst/>
+          </a:prstGeom>
+          <a:noFill/>
+        </p:spPr>
+        <p:txBody>
+          <a:bodyPr wrap="square" rtlCol="0">
+            <a:spAutoFit/>
+          </a:bodyPr>
+          <a:lstStyle/>
+          <a:p>
+            <a:r>
+              <a:rPr lang="pt-PT" sz="1000" dirty="0"/>
+              <a:t>Range AP</a:t>
+            </a:r>
+          </a:p>
+        </p:txBody>
+      </p:sp>
     </p:spTree>
     <p:extLst>
       <p:ext uri="{BB962C8B-B14F-4D97-AF65-F5344CB8AC3E}">

</xml_diff>